<commit_message>
Update Meilenstein 2 - Design.pptx
</commit_message>
<xml_diff>
--- a/Abgabe_Meilenstein2/Meilenstein 2 - Design.pptx
+++ b/Abgabe_Meilenstein2/Meilenstein 2 - Design.pptx
@@ -201,7 +201,7 @@
       </p:grpSpPr>
       <p:sp>
         <p:nvSpPr>
-          <p:cNvPr id="1305647073" name="Rectangle 2"/>
+          <p:cNvPr id="1513512111" name="Rectangle 2"/>
           <p:cNvSpPr>
             <a:spLocks noChangeArrowheads="1" noGrp="1"/>
           </p:cNvSpPr>
@@ -245,7 +245,7 @@
       </p:sp>
       <p:sp>
         <p:nvSpPr>
-          <p:cNvPr id="266948894" name="Rectangle 3"/>
+          <p:cNvPr id="409069313" name="Rectangle 3"/>
           <p:cNvSpPr>
             <a:spLocks noChangeArrowheads="1" noGrp="1"/>
           </p:cNvSpPr>
@@ -289,7 +289,7 @@
       </p:sp>
       <p:sp>
         <p:nvSpPr>
-          <p:cNvPr id="1230723089" name="Rectangle 4"/>
+          <p:cNvPr id="1639833030" name="Rectangle 4"/>
           <p:cNvSpPr>
             <a:spLocks noChangeArrowheads="1" noChangeAspect="1" noGrp="1" noRot="1" noTextEdit="1"/>
           </p:cNvSpPr>
@@ -319,7 +319,7 @@
       </p:sp>
       <p:sp>
         <p:nvSpPr>
-          <p:cNvPr id="1871440641" name="Rectangle 5"/>
+          <p:cNvPr id="289584607" name="Rectangle 5"/>
           <p:cNvSpPr>
             <a:spLocks noChangeArrowheads="1" noGrp="1"/>
           </p:cNvSpPr>
@@ -400,7 +400,7 @@
       </p:sp>
       <p:sp>
         <p:nvSpPr>
-          <p:cNvPr id="195619272" name="Rectangle 6"/>
+          <p:cNvPr id="1094398625" name="Rectangle 6"/>
           <p:cNvSpPr>
             <a:spLocks noChangeArrowheads="1" noGrp="1"/>
           </p:cNvSpPr>
@@ -444,7 +444,7 @@
       </p:sp>
       <p:sp>
         <p:nvSpPr>
-          <p:cNvPr id="1906524177" name="Rectangle 7"/>
+          <p:cNvPr id="672630038" name="Rectangle 7"/>
           <p:cNvSpPr>
             <a:spLocks noChangeArrowheads="1" noGrp="1"/>
           </p:cNvSpPr>
@@ -634,7 +634,7 @@
       </p:grpSpPr>
       <p:sp>
         <p:nvSpPr>
-          <p:cNvPr id="1250589256" name="Folienbildplatzhalter 1"/>
+          <p:cNvPr id="708401681" name="Folienbildplatzhalter 1"/>
           <p:cNvSpPr>
             <a:spLocks noChangeAspect="1" noGrp="1" noRot="1"/>
           </p:cNvSpPr>
@@ -646,7 +646,7 @@
       </p:sp>
       <p:sp>
         <p:nvSpPr>
-          <p:cNvPr id="251500676" name="Notizenplatzhalter 2"/>
+          <p:cNvPr id="750092914" name="Notizenplatzhalter 2"/>
           <p:cNvSpPr>
             <a:spLocks noGrp="1"/>
           </p:cNvSpPr>
@@ -668,7 +668,7 @@
       </p:sp>
       <p:sp>
         <p:nvSpPr>
-          <p:cNvPr id="1593099968" name="Foliennummernplatzhalter 3"/>
+          <p:cNvPr id="1895691313" name="Foliennummernplatzhalter 3"/>
           <p:cNvSpPr>
             <a:spLocks noGrp="1"/>
           </p:cNvSpPr>
@@ -719,7 +719,7 @@
       </p:grpSpPr>
       <p:sp>
         <p:nvSpPr>
-          <p:cNvPr id="254492036" name="Slide Image Placeholder 1"/>
+          <p:cNvPr id="1267643775" name="Slide Image Placeholder 1"/>
           <p:cNvSpPr>
             <a:spLocks noChangeAspect="1" noGrp="1" noRot="1"/>
           </p:cNvSpPr>
@@ -731,7 +731,7 @@
       </p:sp>
       <p:sp>
         <p:nvSpPr>
-          <p:cNvPr id="1811780223" name="Notes Placeholder 2"/>
+          <p:cNvPr id="1365716083" name="Notes Placeholder 2"/>
           <p:cNvSpPr>
             <a:spLocks noGrp="1"/>
           </p:cNvSpPr>
@@ -753,7 +753,7 @@
       </p:sp>
       <p:sp>
         <p:nvSpPr>
-          <p:cNvPr id="1168797346" name="Slide Number Placeholder 3"/>
+          <p:cNvPr id="984806641" name="Slide Number Placeholder 3"/>
           <p:cNvSpPr>
             <a:spLocks noGrp="1"/>
           </p:cNvSpPr>
@@ -804,7 +804,7 @@
       </p:grpSpPr>
       <p:sp>
         <p:nvSpPr>
-          <p:cNvPr id="386791967" name="Slide Image Placeholder 1"/>
+          <p:cNvPr id="1492798049" name="Slide Image Placeholder 1"/>
           <p:cNvSpPr>
             <a:spLocks noChangeAspect="1" noGrp="1" noRot="1"/>
           </p:cNvSpPr>
@@ -816,7 +816,7 @@
       </p:sp>
       <p:sp>
         <p:nvSpPr>
-          <p:cNvPr id="1883875764" name="Notes Placeholder 2"/>
+          <p:cNvPr id="764363353" name="Notes Placeholder 2"/>
           <p:cNvSpPr>
             <a:spLocks noGrp="1"/>
           </p:cNvSpPr>
@@ -838,7 +838,7 @@
       </p:sp>
       <p:sp>
         <p:nvSpPr>
-          <p:cNvPr id="1395502323" name="Slide Number Placeholder 3"/>
+          <p:cNvPr id="1011102143" name="Slide Number Placeholder 3"/>
           <p:cNvSpPr>
             <a:spLocks noGrp="1"/>
           </p:cNvSpPr>
@@ -889,7 +889,7 @@
       </p:grpSpPr>
       <p:sp>
         <p:nvSpPr>
-          <p:cNvPr id="952070530" name="Slide Image Placeholder 1"/>
+          <p:cNvPr id="159629715" name="Slide Image Placeholder 1"/>
           <p:cNvSpPr>
             <a:spLocks noChangeAspect="1" noGrp="1" noRot="1"/>
           </p:cNvSpPr>
@@ -901,7 +901,7 @@
       </p:sp>
       <p:sp>
         <p:nvSpPr>
-          <p:cNvPr id="1304384033" name="Notes Placeholder 2"/>
+          <p:cNvPr id="1258516952" name="Notes Placeholder 2"/>
           <p:cNvSpPr>
             <a:spLocks noGrp="1"/>
           </p:cNvSpPr>
@@ -923,7 +923,7 @@
       </p:sp>
       <p:sp>
         <p:nvSpPr>
-          <p:cNvPr id="1545104244" name="Slide Number Placeholder 3"/>
+          <p:cNvPr id="1006250674" name="Slide Number Placeholder 3"/>
           <p:cNvSpPr>
             <a:spLocks noGrp="1"/>
           </p:cNvSpPr>
@@ -974,7 +974,7 @@
       </p:grpSpPr>
       <p:sp>
         <p:nvSpPr>
-          <p:cNvPr id="1514303272" name="Slide Image Placeholder 1"/>
+          <p:cNvPr id="1234490772" name="Slide Image Placeholder 1"/>
           <p:cNvSpPr>
             <a:spLocks noChangeAspect="1" noGrp="1" noRot="1"/>
           </p:cNvSpPr>
@@ -986,7 +986,7 @@
       </p:sp>
       <p:sp>
         <p:nvSpPr>
-          <p:cNvPr id="475842796" name="Notes Placeholder 2"/>
+          <p:cNvPr id="584069902" name="Notes Placeholder 2"/>
           <p:cNvSpPr>
             <a:spLocks noGrp="1"/>
           </p:cNvSpPr>
@@ -1008,7 +1008,7 @@
       </p:sp>
       <p:sp>
         <p:nvSpPr>
-          <p:cNvPr id="1540228628" name="Slide Number Placeholder 3"/>
+          <p:cNvPr id="2005195080" name="Slide Number Placeholder 3"/>
           <p:cNvSpPr>
             <a:spLocks noGrp="1"/>
           </p:cNvSpPr>
@@ -1059,7 +1059,7 @@
       </p:grpSpPr>
       <p:sp>
         <p:nvSpPr>
-          <p:cNvPr id="1310213832" name="Slide Image Placeholder 1"/>
+          <p:cNvPr id="1059734708" name="Slide Image Placeholder 1"/>
           <p:cNvSpPr>
             <a:spLocks noChangeAspect="1" noGrp="1" noRot="1"/>
           </p:cNvSpPr>
@@ -1071,7 +1071,7 @@
       </p:sp>
       <p:sp>
         <p:nvSpPr>
-          <p:cNvPr id="797054113" name="Notes Placeholder 2"/>
+          <p:cNvPr id="2019138234" name="Notes Placeholder 2"/>
           <p:cNvSpPr>
             <a:spLocks noGrp="1"/>
           </p:cNvSpPr>
@@ -1093,7 +1093,7 @@
       </p:sp>
       <p:sp>
         <p:nvSpPr>
-          <p:cNvPr id="356959124" name="Slide Number Placeholder 3"/>
+          <p:cNvPr id="2006290629" name="Slide Number Placeholder 3"/>
           <p:cNvSpPr>
             <a:spLocks noGrp="1"/>
           </p:cNvSpPr>
@@ -1144,7 +1144,7 @@
       </p:grpSpPr>
       <p:sp>
         <p:nvSpPr>
-          <p:cNvPr id="619335350" name="Slide Image Placeholder 1"/>
+          <p:cNvPr id="1108058626" name="Slide Image Placeholder 1"/>
           <p:cNvSpPr>
             <a:spLocks noChangeAspect="1" noGrp="1" noRot="1"/>
           </p:cNvSpPr>
@@ -1156,7 +1156,7 @@
       </p:sp>
       <p:sp>
         <p:nvSpPr>
-          <p:cNvPr id="1583618089" name="Notes Placeholder 2"/>
+          <p:cNvPr id="141702698" name="Notes Placeholder 2"/>
           <p:cNvSpPr>
             <a:spLocks noGrp="1"/>
           </p:cNvSpPr>
@@ -1178,7 +1178,7 @@
       </p:sp>
       <p:sp>
         <p:nvSpPr>
-          <p:cNvPr id="1404164393" name="Slide Number Placeholder 3"/>
+          <p:cNvPr id="1341016898" name="Slide Number Placeholder 3"/>
           <p:cNvSpPr>
             <a:spLocks noGrp="1"/>
           </p:cNvSpPr>
@@ -1229,7 +1229,7 @@
       </p:grpSpPr>
       <p:sp>
         <p:nvSpPr>
-          <p:cNvPr id="1304083901" name="Slide Image Placeholder 1"/>
+          <p:cNvPr id="2111836093" name="Slide Image Placeholder 1"/>
           <p:cNvSpPr>
             <a:spLocks noChangeAspect="1" noGrp="1" noRot="1"/>
           </p:cNvSpPr>
@@ -1241,7 +1241,7 @@
       </p:sp>
       <p:sp>
         <p:nvSpPr>
-          <p:cNvPr id="1019609901" name="Notes Placeholder 2"/>
+          <p:cNvPr id="973917448" name="Notes Placeholder 2"/>
           <p:cNvSpPr>
             <a:spLocks noGrp="1"/>
           </p:cNvSpPr>
@@ -1263,7 +1263,7 @@
       </p:sp>
       <p:sp>
         <p:nvSpPr>
-          <p:cNvPr id="1475421191" name="Slide Number Placeholder 3"/>
+          <p:cNvPr id="671503502" name="Slide Number Placeholder 3"/>
           <p:cNvSpPr>
             <a:spLocks noGrp="1"/>
           </p:cNvSpPr>
@@ -1314,7 +1314,7 @@
       </p:grpSpPr>
       <p:sp>
         <p:nvSpPr>
-          <p:cNvPr id="2073609855" name="Slide Image Placeholder 1"/>
+          <p:cNvPr id="1035826654" name="Slide Image Placeholder 1"/>
           <p:cNvSpPr>
             <a:spLocks noChangeAspect="1" noGrp="1" noRot="1"/>
           </p:cNvSpPr>
@@ -1326,7 +1326,7 @@
       </p:sp>
       <p:sp>
         <p:nvSpPr>
-          <p:cNvPr id="1032747112" name="Notes Placeholder 2"/>
+          <p:cNvPr id="1028508323" name="Notes Placeholder 2"/>
           <p:cNvSpPr>
             <a:spLocks noGrp="1"/>
           </p:cNvSpPr>
@@ -1348,7 +1348,7 @@
       </p:sp>
       <p:sp>
         <p:nvSpPr>
-          <p:cNvPr id="1851934793" name="Slide Number Placeholder 3"/>
+          <p:cNvPr id="1425112941" name="Slide Number Placeholder 3"/>
           <p:cNvSpPr>
             <a:spLocks noGrp="1"/>
           </p:cNvSpPr>
@@ -1399,7 +1399,7 @@
       </p:grpSpPr>
       <p:sp>
         <p:nvSpPr>
-          <p:cNvPr id="1213862612" name="Slide Image Placeholder 1"/>
+          <p:cNvPr id="75556576" name="Slide Image Placeholder 1"/>
           <p:cNvSpPr>
             <a:spLocks noChangeAspect="1" noGrp="1" noRot="1"/>
           </p:cNvSpPr>
@@ -1411,7 +1411,7 @@
       </p:sp>
       <p:sp>
         <p:nvSpPr>
-          <p:cNvPr id="189739864" name="Notes Placeholder 2"/>
+          <p:cNvPr id="414282258" name="Notes Placeholder 2"/>
           <p:cNvSpPr>
             <a:spLocks noGrp="1"/>
           </p:cNvSpPr>
@@ -1433,7 +1433,7 @@
       </p:sp>
       <p:sp>
         <p:nvSpPr>
-          <p:cNvPr id="1500218632" name="Slide Number Placeholder 3"/>
+          <p:cNvPr id="837767938" name="Slide Number Placeholder 3"/>
           <p:cNvSpPr>
             <a:spLocks noGrp="1"/>
           </p:cNvSpPr>
@@ -1484,7 +1484,7 @@
       </p:grpSpPr>
       <p:sp>
         <p:nvSpPr>
-          <p:cNvPr id="449571201" name="Slide Image Placeholder 1"/>
+          <p:cNvPr id="11955292" name="Slide Image Placeholder 1"/>
           <p:cNvSpPr>
             <a:spLocks noChangeAspect="1" noGrp="1" noRot="1"/>
           </p:cNvSpPr>
@@ -1496,7 +1496,7 @@
       </p:sp>
       <p:sp>
         <p:nvSpPr>
-          <p:cNvPr id="83833659" name="Notes Placeholder 2"/>
+          <p:cNvPr id="1264441273" name="Notes Placeholder 2"/>
           <p:cNvSpPr>
             <a:spLocks noGrp="1"/>
           </p:cNvSpPr>
@@ -1518,7 +1518,7 @@
       </p:sp>
       <p:sp>
         <p:nvSpPr>
-          <p:cNvPr id="7592938" name="Slide Number Placeholder 3"/>
+          <p:cNvPr id="460392017" name="Slide Number Placeholder 3"/>
           <p:cNvSpPr>
             <a:spLocks noGrp="1"/>
           </p:cNvSpPr>
@@ -1569,7 +1569,7 @@
       </p:grpSpPr>
       <p:sp>
         <p:nvSpPr>
-          <p:cNvPr id="200789416" name="Slide Image Placeholder 1"/>
+          <p:cNvPr id="1811569111" name="Slide Image Placeholder 1"/>
           <p:cNvSpPr>
             <a:spLocks noChangeAspect="1" noGrp="1" noRot="1"/>
           </p:cNvSpPr>
@@ -1581,7 +1581,7 @@
       </p:sp>
       <p:sp>
         <p:nvSpPr>
-          <p:cNvPr id="1126983814" name="Notes Placeholder 2"/>
+          <p:cNvPr id="1735494810" name="Notes Placeholder 2"/>
           <p:cNvSpPr>
             <a:spLocks noGrp="1"/>
           </p:cNvSpPr>
@@ -1603,7 +1603,7 @@
       </p:sp>
       <p:sp>
         <p:nvSpPr>
-          <p:cNvPr id="2028592174" name="Slide Number Placeholder 3"/>
+          <p:cNvPr id="1559878754" name="Slide Number Placeholder 3"/>
           <p:cNvSpPr>
             <a:spLocks noGrp="1"/>
           </p:cNvSpPr>
@@ -1654,7 +1654,7 @@
       </p:grpSpPr>
       <p:sp>
         <p:nvSpPr>
-          <p:cNvPr id="2068217463" name="Slide Image Placeholder 1"/>
+          <p:cNvPr id="1715537845" name="Slide Image Placeholder 1"/>
           <p:cNvSpPr>
             <a:spLocks noChangeAspect="1" noGrp="1" noRot="1"/>
           </p:cNvSpPr>
@@ -1666,7 +1666,7 @@
       </p:sp>
       <p:sp>
         <p:nvSpPr>
-          <p:cNvPr id="131904326" name="Notes Placeholder 2"/>
+          <p:cNvPr id="305195047" name="Notes Placeholder 2"/>
           <p:cNvSpPr>
             <a:spLocks noGrp="1"/>
           </p:cNvSpPr>
@@ -1688,7 +1688,7 @@
       </p:sp>
       <p:sp>
         <p:nvSpPr>
-          <p:cNvPr id="1621824572" name="Slide Number Placeholder 3"/>
+          <p:cNvPr id="1473345282" name="Slide Number Placeholder 3"/>
           <p:cNvSpPr>
             <a:spLocks noGrp="1"/>
           </p:cNvSpPr>
@@ -1739,7 +1739,7 @@
       </p:grpSpPr>
       <p:sp>
         <p:nvSpPr>
-          <p:cNvPr id="2094251256" name="Slide Image Placeholder 1"/>
+          <p:cNvPr id="805623507" name="Slide Image Placeholder 1"/>
           <p:cNvSpPr>
             <a:spLocks noChangeAspect="1" noGrp="1" noRot="1"/>
           </p:cNvSpPr>
@@ -1751,7 +1751,7 @@
       </p:sp>
       <p:sp>
         <p:nvSpPr>
-          <p:cNvPr id="2104835251" name="Notes Placeholder 2"/>
+          <p:cNvPr id="1705801510" name="Notes Placeholder 2"/>
           <p:cNvSpPr>
             <a:spLocks noGrp="1"/>
           </p:cNvSpPr>
@@ -1773,7 +1773,7 @@
       </p:sp>
       <p:sp>
         <p:nvSpPr>
-          <p:cNvPr id="1817618328" name="Slide Number Placeholder 3"/>
+          <p:cNvPr id="1249049345" name="Slide Number Placeholder 3"/>
           <p:cNvSpPr>
             <a:spLocks noGrp="1"/>
           </p:cNvSpPr>
@@ -1824,7 +1824,7 @@
       </p:grpSpPr>
       <p:sp>
         <p:nvSpPr>
-          <p:cNvPr id="1278616721" name="Slide Image Placeholder 1"/>
+          <p:cNvPr id="65375686" name="Slide Image Placeholder 1"/>
           <p:cNvSpPr>
             <a:spLocks noChangeAspect="1" noGrp="1" noRot="1"/>
           </p:cNvSpPr>
@@ -1836,7 +1836,7 @@
       </p:sp>
       <p:sp>
         <p:nvSpPr>
-          <p:cNvPr id="292607121" name="Notes Placeholder 2"/>
+          <p:cNvPr id="1641338503" name="Notes Placeholder 2"/>
           <p:cNvSpPr>
             <a:spLocks noGrp="1"/>
           </p:cNvSpPr>
@@ -1858,7 +1858,7 @@
       </p:sp>
       <p:sp>
         <p:nvSpPr>
-          <p:cNvPr id="1168707073" name="Slide Number Placeholder 3"/>
+          <p:cNvPr id="15607015" name="Slide Number Placeholder 3"/>
           <p:cNvSpPr>
             <a:spLocks noGrp="1"/>
           </p:cNvSpPr>
@@ -1909,7 +1909,7 @@
       </p:grpSpPr>
       <p:sp>
         <p:nvSpPr>
-          <p:cNvPr id="706401233" name="Slide Image Placeholder 1"/>
+          <p:cNvPr id="1923487790" name="Slide Image Placeholder 1"/>
           <p:cNvSpPr>
             <a:spLocks noChangeAspect="1" noGrp="1" noRot="1"/>
           </p:cNvSpPr>
@@ -1921,7 +1921,7 @@
       </p:sp>
       <p:sp>
         <p:nvSpPr>
-          <p:cNvPr id="227147077" name="Notes Placeholder 2"/>
+          <p:cNvPr id="2032976195" name="Notes Placeholder 2"/>
           <p:cNvSpPr>
             <a:spLocks noGrp="1"/>
           </p:cNvSpPr>
@@ -1943,7 +1943,7 @@
       </p:sp>
       <p:sp>
         <p:nvSpPr>
-          <p:cNvPr id="1238612697" name="Slide Number Placeholder 3"/>
+          <p:cNvPr id="1737971439" name="Slide Number Placeholder 3"/>
           <p:cNvSpPr>
             <a:spLocks noGrp="1"/>
           </p:cNvSpPr>
@@ -1994,7 +1994,7 @@
       </p:grpSpPr>
       <p:sp>
         <p:nvSpPr>
-          <p:cNvPr id="1573147593" name="Slide Image Placeholder 1"/>
+          <p:cNvPr id="2072467000" name="Slide Image Placeholder 1"/>
           <p:cNvSpPr>
             <a:spLocks noChangeAspect="1" noGrp="1" noRot="1"/>
           </p:cNvSpPr>
@@ -2006,7 +2006,7 @@
       </p:sp>
       <p:sp>
         <p:nvSpPr>
-          <p:cNvPr id="1152785609" name="Notes Placeholder 2"/>
+          <p:cNvPr id="590789699" name="Notes Placeholder 2"/>
           <p:cNvSpPr>
             <a:spLocks noGrp="1"/>
           </p:cNvSpPr>
@@ -2028,7 +2028,7 @@
       </p:sp>
       <p:sp>
         <p:nvSpPr>
-          <p:cNvPr id="618967407" name="Slide Number Placeholder 3"/>
+          <p:cNvPr id="1861751868" name="Slide Number Placeholder 3"/>
           <p:cNvSpPr>
             <a:spLocks noGrp="1"/>
           </p:cNvSpPr>
@@ -2079,7 +2079,7 @@
       </p:grpSpPr>
       <p:sp>
         <p:nvSpPr>
-          <p:cNvPr id="788204902" name="Slide Image Placeholder 1"/>
+          <p:cNvPr id="112006203" name="Slide Image Placeholder 1"/>
           <p:cNvSpPr>
             <a:spLocks noChangeAspect="1" noGrp="1" noRot="1"/>
           </p:cNvSpPr>
@@ -2091,7 +2091,7 @@
       </p:sp>
       <p:sp>
         <p:nvSpPr>
-          <p:cNvPr id="1878088120" name="Notes Placeholder 2"/>
+          <p:cNvPr id="166291755" name="Notes Placeholder 2"/>
           <p:cNvSpPr>
             <a:spLocks noGrp="1"/>
           </p:cNvSpPr>
@@ -2113,7 +2113,7 @@
       </p:sp>
       <p:sp>
         <p:nvSpPr>
-          <p:cNvPr id="1042165464" name="Slide Number Placeholder 3"/>
+          <p:cNvPr id="1222380986" name="Slide Number Placeholder 3"/>
           <p:cNvSpPr>
             <a:spLocks noGrp="1"/>
           </p:cNvSpPr>
@@ -2164,7 +2164,7 @@
       </p:grpSpPr>
       <p:sp>
         <p:nvSpPr>
-          <p:cNvPr id="959240935" name="Slide Image Placeholder 1"/>
+          <p:cNvPr id="743946724" name="Slide Image Placeholder 1"/>
           <p:cNvSpPr>
             <a:spLocks noChangeAspect="1" noGrp="1" noRot="1"/>
           </p:cNvSpPr>
@@ -2176,7 +2176,7 @@
       </p:sp>
       <p:sp>
         <p:nvSpPr>
-          <p:cNvPr id="1391967371" name="Notes Placeholder 2"/>
+          <p:cNvPr id="219047424" name="Notes Placeholder 2"/>
           <p:cNvSpPr>
             <a:spLocks noGrp="1"/>
           </p:cNvSpPr>
@@ -2198,7 +2198,7 @@
       </p:sp>
       <p:sp>
         <p:nvSpPr>
-          <p:cNvPr id="1618730521" name="Slide Number Placeholder 3"/>
+          <p:cNvPr id="1669316433" name="Slide Number Placeholder 3"/>
           <p:cNvSpPr>
             <a:spLocks noGrp="1"/>
           </p:cNvSpPr>
@@ -2249,7 +2249,7 @@
       </p:grpSpPr>
       <p:sp>
         <p:nvSpPr>
-          <p:cNvPr id="1551532369" name="Slide Image Placeholder 1"/>
+          <p:cNvPr id="778151148" name="Slide Image Placeholder 1"/>
           <p:cNvSpPr>
             <a:spLocks noChangeAspect="1" noGrp="1" noRot="1"/>
           </p:cNvSpPr>
@@ -2261,7 +2261,7 @@
       </p:sp>
       <p:sp>
         <p:nvSpPr>
-          <p:cNvPr id="1930115350" name="Notes Placeholder 2"/>
+          <p:cNvPr id="305490708" name="Notes Placeholder 2"/>
           <p:cNvSpPr>
             <a:spLocks noGrp="1"/>
           </p:cNvSpPr>
@@ -2283,7 +2283,7 @@
       </p:sp>
       <p:sp>
         <p:nvSpPr>
-          <p:cNvPr id="1054384247" name="Slide Number Placeholder 3"/>
+          <p:cNvPr id="929997383" name="Slide Number Placeholder 3"/>
           <p:cNvSpPr>
             <a:spLocks noGrp="1"/>
           </p:cNvSpPr>
@@ -2334,7 +2334,7 @@
       </p:grpSpPr>
       <p:sp>
         <p:nvSpPr>
-          <p:cNvPr id="1318521788" name="Slide Image Placeholder 1"/>
+          <p:cNvPr id="935902563" name="Slide Image Placeholder 1"/>
           <p:cNvSpPr>
             <a:spLocks noChangeAspect="1" noGrp="1" noRot="1"/>
           </p:cNvSpPr>
@@ -2346,7 +2346,7 @@
       </p:sp>
       <p:sp>
         <p:nvSpPr>
-          <p:cNvPr id="315947320" name="Notes Placeholder 2"/>
+          <p:cNvPr id="1475105424" name="Notes Placeholder 2"/>
           <p:cNvSpPr>
             <a:spLocks noGrp="1"/>
           </p:cNvSpPr>
@@ -2368,7 +2368,7 @@
       </p:sp>
       <p:sp>
         <p:nvSpPr>
-          <p:cNvPr id="1545786015" name="Slide Number Placeholder 3"/>
+          <p:cNvPr id="1249032767" name="Slide Number Placeholder 3"/>
           <p:cNvSpPr>
             <a:spLocks noGrp="1"/>
           </p:cNvSpPr>
@@ -2419,7 +2419,7 @@
       </p:grpSpPr>
       <p:sp>
         <p:nvSpPr>
-          <p:cNvPr id="1768153068" name="Slide Image Placeholder 1"/>
+          <p:cNvPr id="497517648" name="Slide Image Placeholder 1"/>
           <p:cNvSpPr>
             <a:spLocks noChangeAspect="1" noGrp="1" noRot="1"/>
           </p:cNvSpPr>
@@ -2431,7 +2431,7 @@
       </p:sp>
       <p:sp>
         <p:nvSpPr>
-          <p:cNvPr id="933477165" name="Notes Placeholder 2"/>
+          <p:cNvPr id="511052138" name="Notes Placeholder 2"/>
           <p:cNvSpPr>
             <a:spLocks noGrp="1"/>
           </p:cNvSpPr>
@@ -2453,7 +2453,7 @@
       </p:sp>
       <p:sp>
         <p:nvSpPr>
-          <p:cNvPr id="772999624" name="Slide Number Placeholder 3"/>
+          <p:cNvPr id="1993726392" name="Slide Number Placeholder 3"/>
           <p:cNvSpPr>
             <a:spLocks noGrp="1"/>
           </p:cNvSpPr>
@@ -2504,7 +2504,7 @@
       </p:grpSpPr>
       <p:sp>
         <p:nvSpPr>
-          <p:cNvPr id="1380796800" name="Slide Image Placeholder 1"/>
+          <p:cNvPr id="577244151" name="Slide Image Placeholder 1"/>
           <p:cNvSpPr>
             <a:spLocks noChangeAspect="1" noGrp="1" noRot="1"/>
           </p:cNvSpPr>
@@ -2516,7 +2516,7 @@
       </p:sp>
       <p:sp>
         <p:nvSpPr>
-          <p:cNvPr id="2093324385" name="Notes Placeholder 2"/>
+          <p:cNvPr id="568276023" name="Notes Placeholder 2"/>
           <p:cNvSpPr>
             <a:spLocks noGrp="1"/>
           </p:cNvSpPr>
@@ -2538,7 +2538,7 @@
       </p:sp>
       <p:sp>
         <p:nvSpPr>
-          <p:cNvPr id="2037346944" name="Slide Number Placeholder 3"/>
+          <p:cNvPr id="1853052078" name="Slide Number Placeholder 3"/>
           <p:cNvSpPr>
             <a:spLocks noGrp="1"/>
           </p:cNvSpPr>
@@ -2589,7 +2589,7 @@
       </p:grpSpPr>
       <p:sp>
         <p:nvSpPr>
-          <p:cNvPr id="1719964070" name="Slide Image Placeholder 1"/>
+          <p:cNvPr id="200753468" name="Slide Image Placeholder 1"/>
           <p:cNvSpPr>
             <a:spLocks noChangeAspect="1" noGrp="1" noRot="1"/>
           </p:cNvSpPr>
@@ -2601,7 +2601,7 @@
       </p:sp>
       <p:sp>
         <p:nvSpPr>
-          <p:cNvPr id="871080158" name="Notes Placeholder 2"/>
+          <p:cNvPr id="519020596" name="Notes Placeholder 2"/>
           <p:cNvSpPr>
             <a:spLocks noGrp="1"/>
           </p:cNvSpPr>
@@ -2623,7 +2623,7 @@
       </p:sp>
       <p:sp>
         <p:nvSpPr>
-          <p:cNvPr id="757781259" name="Slide Number Placeholder 3"/>
+          <p:cNvPr id="232306809" name="Slide Number Placeholder 3"/>
           <p:cNvSpPr>
             <a:spLocks noGrp="1"/>
           </p:cNvSpPr>
@@ -2674,7 +2674,7 @@
       </p:grpSpPr>
       <p:sp>
         <p:nvSpPr>
-          <p:cNvPr id="740060790" name="Slide Image Placeholder 1"/>
+          <p:cNvPr id="42332439" name="Slide Image Placeholder 1"/>
           <p:cNvSpPr>
             <a:spLocks noChangeAspect="1" noGrp="1" noRot="1"/>
           </p:cNvSpPr>
@@ -2686,7 +2686,7 @@
       </p:sp>
       <p:sp>
         <p:nvSpPr>
-          <p:cNvPr id="736796591" name="Notes Placeholder 2"/>
+          <p:cNvPr id="1830426611" name="Notes Placeholder 2"/>
           <p:cNvSpPr>
             <a:spLocks noGrp="1"/>
           </p:cNvSpPr>
@@ -2708,7 +2708,7 @@
       </p:sp>
       <p:sp>
         <p:nvSpPr>
-          <p:cNvPr id="1794937298" name="Slide Number Placeholder 3"/>
+          <p:cNvPr id="215777218" name="Slide Number Placeholder 3"/>
           <p:cNvSpPr>
             <a:spLocks noGrp="1"/>
           </p:cNvSpPr>
@@ -2759,7 +2759,7 @@
       </p:grpSpPr>
       <p:sp>
         <p:nvSpPr>
-          <p:cNvPr id="2" name="Slide Image Placeholder 1"/>
+          <p:cNvPr id="2115881741" name="Slide Image Placeholder 1"/>
           <p:cNvSpPr>
             <a:spLocks noChangeAspect="1" noGrp="1" noRot="1"/>
           </p:cNvSpPr>
@@ -2771,7 +2771,7 @@
       </p:sp>
       <p:sp>
         <p:nvSpPr>
-          <p:cNvPr id="3" name="Notes Placeholder 2"/>
+          <p:cNvPr id="1241385878" name="Notes Placeholder 2"/>
           <p:cNvSpPr>
             <a:spLocks noGrp="1"/>
           </p:cNvSpPr>
@@ -2793,7 +2793,7 @@
       </p:sp>
       <p:sp>
         <p:nvSpPr>
-          <p:cNvPr id="4" name="Slide Number Placeholder 3"/>
+          <p:cNvPr id="1354135217" name="Slide Number Placeholder 3"/>
           <p:cNvSpPr>
             <a:spLocks noGrp="1"/>
           </p:cNvSpPr>
@@ -2844,7 +2844,7 @@
       </p:grpSpPr>
       <p:sp>
         <p:nvSpPr>
-          <p:cNvPr id="2" name="Slide Image Placeholder 1"/>
+          <p:cNvPr id="1571940878" name="Slide Image Placeholder 1"/>
           <p:cNvSpPr>
             <a:spLocks noChangeAspect="1" noGrp="1" noRot="1"/>
           </p:cNvSpPr>
@@ -2856,7 +2856,7 @@
       </p:sp>
       <p:sp>
         <p:nvSpPr>
-          <p:cNvPr id="3" name="Notes Placeholder 2"/>
+          <p:cNvPr id="2113715480" name="Notes Placeholder 2"/>
           <p:cNvSpPr>
             <a:spLocks noGrp="1"/>
           </p:cNvSpPr>
@@ -2878,7 +2878,7 @@
       </p:sp>
       <p:sp>
         <p:nvSpPr>
-          <p:cNvPr id="4" name="Slide Number Placeholder 3"/>
+          <p:cNvPr id="1896100707" name="Slide Number Placeholder 3"/>
           <p:cNvSpPr>
             <a:spLocks noGrp="1"/>
           </p:cNvSpPr>
@@ -2929,7 +2929,7 @@
       </p:grpSpPr>
       <p:sp>
         <p:nvSpPr>
-          <p:cNvPr id="2" name="Slide Image Placeholder 1"/>
+          <p:cNvPr id="1074733501" name="Slide Image Placeholder 1"/>
           <p:cNvSpPr>
             <a:spLocks noChangeAspect="1" noGrp="1" noRot="1"/>
           </p:cNvSpPr>
@@ -2941,7 +2941,7 @@
       </p:sp>
       <p:sp>
         <p:nvSpPr>
-          <p:cNvPr id="3" name="Notes Placeholder 2"/>
+          <p:cNvPr id="956586795" name="Notes Placeholder 2"/>
           <p:cNvSpPr>
             <a:spLocks noGrp="1"/>
           </p:cNvSpPr>
@@ -2963,7 +2963,7 @@
       </p:sp>
       <p:sp>
         <p:nvSpPr>
-          <p:cNvPr id="4" name="Slide Number Placeholder 3"/>
+          <p:cNvPr id="83214232" name="Slide Number Placeholder 3"/>
           <p:cNvSpPr>
             <a:spLocks noGrp="1"/>
           </p:cNvSpPr>
@@ -3014,7 +3014,7 @@
       </p:grpSpPr>
       <p:sp>
         <p:nvSpPr>
-          <p:cNvPr id="2" name="Slide Image Placeholder 1"/>
+          <p:cNvPr id="1752517661" name="Slide Image Placeholder 1"/>
           <p:cNvSpPr>
             <a:spLocks noChangeAspect="1" noGrp="1" noRot="1"/>
           </p:cNvSpPr>
@@ -3026,7 +3026,7 @@
       </p:sp>
       <p:sp>
         <p:nvSpPr>
-          <p:cNvPr id="3" name="Notes Placeholder 2"/>
+          <p:cNvPr id="1054706827" name="Notes Placeholder 2"/>
           <p:cNvSpPr>
             <a:spLocks noGrp="1"/>
           </p:cNvSpPr>
@@ -3048,7 +3048,7 @@
       </p:sp>
       <p:sp>
         <p:nvSpPr>
-          <p:cNvPr id="4" name="Slide Number Placeholder 3"/>
+          <p:cNvPr id="375946896" name="Slide Number Placeholder 3"/>
           <p:cNvSpPr>
             <a:spLocks noGrp="1"/>
           </p:cNvSpPr>
@@ -3099,7 +3099,7 @@
       </p:grpSpPr>
       <p:sp>
         <p:nvSpPr>
-          <p:cNvPr id="582961914" name="Slide Image Placeholder 1"/>
+          <p:cNvPr id="1798774228" name="Slide Image Placeholder 1"/>
           <p:cNvSpPr>
             <a:spLocks noChangeAspect="1" noGrp="1" noRot="1"/>
           </p:cNvSpPr>
@@ -3111,7 +3111,7 @@
       </p:sp>
       <p:sp>
         <p:nvSpPr>
-          <p:cNvPr id="1858417717" name="Notes Placeholder 2"/>
+          <p:cNvPr id="714623475" name="Notes Placeholder 2"/>
           <p:cNvSpPr>
             <a:spLocks noGrp="1"/>
           </p:cNvSpPr>
@@ -3133,7 +3133,7 @@
       </p:sp>
       <p:sp>
         <p:nvSpPr>
-          <p:cNvPr id="1637212018" name="Slide Number Placeholder 3"/>
+          <p:cNvPr id="1234982944" name="Slide Number Placeholder 3"/>
           <p:cNvSpPr>
             <a:spLocks noGrp="1"/>
           </p:cNvSpPr>
@@ -3184,7 +3184,7 @@
       </p:grpSpPr>
       <p:sp>
         <p:nvSpPr>
-          <p:cNvPr id="1554152062" name="Slide Image Placeholder 1"/>
+          <p:cNvPr id="822288220" name="Slide Image Placeholder 1"/>
           <p:cNvSpPr>
             <a:spLocks noChangeAspect="1" noGrp="1" noRot="1"/>
           </p:cNvSpPr>
@@ -3196,7 +3196,7 @@
       </p:sp>
       <p:sp>
         <p:nvSpPr>
-          <p:cNvPr id="929787196" name="Notes Placeholder 2"/>
+          <p:cNvPr id="1454896263" name="Notes Placeholder 2"/>
           <p:cNvSpPr>
             <a:spLocks noGrp="1"/>
           </p:cNvSpPr>
@@ -3218,7 +3218,7 @@
       </p:sp>
       <p:sp>
         <p:nvSpPr>
-          <p:cNvPr id="91747236" name="Slide Number Placeholder 3"/>
+          <p:cNvPr id="530670563" name="Slide Number Placeholder 3"/>
           <p:cNvSpPr>
             <a:spLocks noGrp="1"/>
           </p:cNvSpPr>
@@ -3269,7 +3269,7 @@
       </p:grpSpPr>
       <p:sp>
         <p:nvSpPr>
-          <p:cNvPr id="2144065282" name="Slide Image Placeholder 1"/>
+          <p:cNvPr id="993825292" name="Slide Image Placeholder 1"/>
           <p:cNvSpPr>
             <a:spLocks noChangeAspect="1" noGrp="1" noRot="1"/>
           </p:cNvSpPr>
@@ -3281,7 +3281,7 @@
       </p:sp>
       <p:sp>
         <p:nvSpPr>
-          <p:cNvPr id="1517979944" name="Notes Placeholder 2"/>
+          <p:cNvPr id="1774283461" name="Notes Placeholder 2"/>
           <p:cNvSpPr>
             <a:spLocks noGrp="1"/>
           </p:cNvSpPr>
@@ -3303,7 +3303,7 @@
       </p:sp>
       <p:sp>
         <p:nvSpPr>
-          <p:cNvPr id="1715331883" name="Slide Number Placeholder 3"/>
+          <p:cNvPr id="1403496187" name="Slide Number Placeholder 3"/>
           <p:cNvSpPr>
             <a:spLocks noGrp="1"/>
           </p:cNvSpPr>
@@ -3354,7 +3354,7 @@
       </p:grpSpPr>
       <p:sp>
         <p:nvSpPr>
-          <p:cNvPr id="95648288" name="Slide Image Placeholder 1"/>
+          <p:cNvPr id="913671469" name="Slide Image Placeholder 1"/>
           <p:cNvSpPr>
             <a:spLocks noChangeAspect="1" noGrp="1" noRot="1"/>
           </p:cNvSpPr>
@@ -3366,7 +3366,7 @@
       </p:sp>
       <p:sp>
         <p:nvSpPr>
-          <p:cNvPr id="432033276" name="Notes Placeholder 2"/>
+          <p:cNvPr id="1202717003" name="Notes Placeholder 2"/>
           <p:cNvSpPr>
             <a:spLocks noGrp="1"/>
           </p:cNvSpPr>
@@ -3388,7 +3388,7 @@
       </p:sp>
       <p:sp>
         <p:nvSpPr>
-          <p:cNvPr id="1431285369" name="Slide Number Placeholder 3"/>
+          <p:cNvPr id="635546541" name="Slide Number Placeholder 3"/>
           <p:cNvSpPr>
             <a:spLocks noGrp="1"/>
           </p:cNvSpPr>
@@ -3439,7 +3439,7 @@
       </p:grpSpPr>
       <p:sp>
         <p:nvSpPr>
-          <p:cNvPr id="1960230193" name="Slide Image Placeholder 1"/>
+          <p:cNvPr id="1099683045" name="Slide Image Placeholder 1"/>
           <p:cNvSpPr>
             <a:spLocks noChangeAspect="1" noGrp="1" noRot="1"/>
           </p:cNvSpPr>
@@ -3451,7 +3451,7 @@
       </p:sp>
       <p:sp>
         <p:nvSpPr>
-          <p:cNvPr id="1926384944" name="Notes Placeholder 2"/>
+          <p:cNvPr id="1995754225" name="Notes Placeholder 2"/>
           <p:cNvSpPr>
             <a:spLocks noGrp="1"/>
           </p:cNvSpPr>
@@ -3473,7 +3473,7 @@
       </p:sp>
       <p:sp>
         <p:nvSpPr>
-          <p:cNvPr id="536480059" name="Slide Number Placeholder 3"/>
+          <p:cNvPr id="1821958064" name="Slide Number Placeholder 3"/>
           <p:cNvSpPr>
             <a:spLocks noGrp="1"/>
           </p:cNvSpPr>
@@ -3524,7 +3524,7 @@
       </p:grpSpPr>
       <p:sp>
         <p:nvSpPr>
-          <p:cNvPr id="1826472308" name="Slide Image Placeholder 1"/>
+          <p:cNvPr id="2140938425" name="Slide Image Placeholder 1"/>
           <p:cNvSpPr>
             <a:spLocks noChangeAspect="1" noGrp="1" noRot="1"/>
           </p:cNvSpPr>
@@ -3536,7 +3536,7 @@
       </p:sp>
       <p:sp>
         <p:nvSpPr>
-          <p:cNvPr id="1328364753" name="Notes Placeholder 2"/>
+          <p:cNvPr id="1123940360" name="Notes Placeholder 2"/>
           <p:cNvSpPr>
             <a:spLocks noGrp="1"/>
           </p:cNvSpPr>
@@ -3558,7 +3558,7 @@
       </p:sp>
       <p:sp>
         <p:nvSpPr>
-          <p:cNvPr id="168840835" name="Slide Number Placeholder 3"/>
+          <p:cNvPr id="718526580" name="Slide Number Placeholder 3"/>
           <p:cNvSpPr>
             <a:spLocks noGrp="1"/>
           </p:cNvSpPr>
@@ -3609,7 +3609,7 @@
       </p:grpSpPr>
       <p:sp>
         <p:nvSpPr>
-          <p:cNvPr id="600553587" name="Titelplatzhalter 25"/>
+          <p:cNvPr id="1003589597" name="Titelplatzhalter 25"/>
           <p:cNvSpPr>
             <a:spLocks noGrp="1"/>
           </p:cNvSpPr>
@@ -3706,7 +3706,7 @@
       </p:grpSpPr>
       <p:sp>
         <p:nvSpPr>
-          <p:cNvPr id="278885714" name="Titel 3"/>
+          <p:cNvPr id="1481987929" name="Titel 3"/>
           <p:cNvSpPr>
             <a:spLocks noGrp="1"/>
           </p:cNvSpPr>
@@ -3746,7 +3746,7 @@
       </p:sp>
       <p:sp>
         <p:nvSpPr>
-          <p:cNvPr id="1250918635" name="Textplatzhalter 7"/>
+          <p:cNvPr id="717203998" name="Textplatzhalter 7"/>
           <p:cNvSpPr>
             <a:spLocks noGrp="1"/>
           </p:cNvSpPr>
@@ -3818,7 +3818,7 @@
       </p:sp>
       <p:sp>
         <p:nvSpPr>
-          <p:cNvPr id="1369607877" name="Bildplatzhalter 2"/>
+          <p:cNvPr id="1634775225" name="Bildplatzhalter 2"/>
           <p:cNvSpPr>
             <a:spLocks noGrp="1"/>
           </p:cNvSpPr>
@@ -3860,7 +3860,7 @@
       </p:sp>
       <p:sp>
         <p:nvSpPr>
-          <p:cNvPr id="562592383" name="Textplatzhalter 7"/>
+          <p:cNvPr id="1475350880" name="Textplatzhalter 7"/>
           <p:cNvSpPr>
             <a:spLocks noGrp="1"/>
           </p:cNvSpPr>
@@ -3967,7 +3967,7 @@
       </p:sp>
       <p:sp>
         <p:nvSpPr>
-          <p:cNvPr id="1785229918" name="Bildplatzhalter 2"/>
+          <p:cNvPr id="1511010009" name="Bildplatzhalter 2"/>
           <p:cNvSpPr>
             <a:spLocks noGrp="1"/>
           </p:cNvSpPr>
@@ -4009,7 +4009,7 @@
       </p:sp>
       <p:sp>
         <p:nvSpPr>
-          <p:cNvPr id="1640089173" name="Textplatzhalter 7"/>
+          <p:cNvPr id="680755502" name="Textplatzhalter 7"/>
           <p:cNvSpPr>
             <a:spLocks noGrp="1"/>
           </p:cNvSpPr>
@@ -4116,7 +4116,7 @@
       </p:sp>
       <p:sp>
         <p:nvSpPr>
-          <p:cNvPr id="1624390093" name="Bildplatzhalter 2"/>
+          <p:cNvPr id="1027266838" name="Bildplatzhalter 2"/>
           <p:cNvSpPr>
             <a:spLocks noGrp="1"/>
           </p:cNvSpPr>
@@ -4158,7 +4158,7 @@
       </p:sp>
       <p:sp>
         <p:nvSpPr>
-          <p:cNvPr id="378914876" name="Textplatzhalter 7"/>
+          <p:cNvPr id="1134578645" name="Textplatzhalter 7"/>
           <p:cNvSpPr>
             <a:spLocks noGrp="1"/>
           </p:cNvSpPr>
@@ -4290,7 +4290,7 @@
       </p:grpSpPr>
       <p:sp>
         <p:nvSpPr>
-          <p:cNvPr id="1872982340" name="Titelplatzhalter 25"/>
+          <p:cNvPr id="61923609" name="Titelplatzhalter 25"/>
           <p:cNvSpPr>
             <a:spLocks noGrp="1"/>
           </p:cNvSpPr>
@@ -4334,7 +4334,7 @@
       </p:sp>
       <p:sp>
         <p:nvSpPr>
-          <p:cNvPr id="591575090" name="Textplatzhalter 7"/>
+          <p:cNvPr id="1642219285" name="Textplatzhalter 7"/>
           <p:cNvSpPr>
             <a:spLocks noGrp="1"/>
           </p:cNvSpPr>
@@ -4406,7 +4406,7 @@
       </p:sp>
       <p:sp>
         <p:nvSpPr>
-          <p:cNvPr id="264036305" name="Bildplatzhalter 2"/>
+          <p:cNvPr id="93057270" name="Bildplatzhalter 2"/>
           <p:cNvSpPr>
             <a:spLocks noGrp="1"/>
           </p:cNvSpPr>
@@ -4448,7 +4448,7 @@
       </p:sp>
       <p:sp>
         <p:nvSpPr>
-          <p:cNvPr id="1408023476" name="Bildplatzhalter 2"/>
+          <p:cNvPr id="1506885297" name="Bildplatzhalter 2"/>
           <p:cNvSpPr>
             <a:spLocks noGrp="1"/>
           </p:cNvSpPr>
@@ -4490,7 +4490,7 @@
       </p:sp>
       <p:sp>
         <p:nvSpPr>
-          <p:cNvPr id="1152113337" name="Bildplatzhalter 2"/>
+          <p:cNvPr id="1053497780" name="Bildplatzhalter 2"/>
           <p:cNvSpPr>
             <a:spLocks noGrp="1"/>
           </p:cNvSpPr>
@@ -4532,7 +4532,7 @@
       </p:sp>
       <p:sp>
         <p:nvSpPr>
-          <p:cNvPr id="787511661" name="Bildplatzhalter 4"/>
+          <p:cNvPr id="1902824997" name="Bildplatzhalter 4"/>
           <p:cNvSpPr>
             <a:spLocks noGrp="1"/>
           </p:cNvSpPr>
@@ -4576,7 +4576,7 @@
       </p:sp>
       <p:sp>
         <p:nvSpPr>
-          <p:cNvPr id="129111198" name="Textplatzhalter 7"/>
+          <p:cNvPr id="150128585" name="Textplatzhalter 7"/>
           <p:cNvSpPr>
             <a:spLocks noGrp="1"/>
           </p:cNvSpPr>
@@ -4669,7 +4669,7 @@
       </p:grpSpPr>
       <p:sp>
         <p:nvSpPr>
-          <p:cNvPr id="1620456153" name="Titelplatzhalter 25"/>
+          <p:cNvPr id="981242641" name="Titelplatzhalter 25"/>
           <p:cNvSpPr>
             <a:spLocks noGrp="1"/>
           </p:cNvSpPr>
@@ -4713,7 +4713,7 @@
       </p:sp>
       <p:sp>
         <p:nvSpPr>
-          <p:cNvPr id="1816443109" name="Bildplatzhalter 4"/>
+          <p:cNvPr id="334945498" name="Bildplatzhalter 4"/>
           <p:cNvSpPr>
             <a:spLocks noGrp="1"/>
           </p:cNvSpPr>
@@ -4757,7 +4757,7 @@
       </p:sp>
       <p:sp>
         <p:nvSpPr>
-          <p:cNvPr id="1082765462" name="Textplatzhalter 7"/>
+          <p:cNvPr id="2119615894" name="Textplatzhalter 7"/>
           <p:cNvSpPr>
             <a:spLocks noGrp="1"/>
           </p:cNvSpPr>
@@ -4829,7 +4829,7 @@
       </p:sp>
       <p:sp>
         <p:nvSpPr>
-          <p:cNvPr id="37026748" name="Bildplatzhalter 2"/>
+          <p:cNvPr id="1517551816" name="Bildplatzhalter 2"/>
           <p:cNvSpPr>
             <a:spLocks noGrp="1"/>
           </p:cNvSpPr>
@@ -4896,7 +4896,7 @@
       </p:grpSpPr>
       <p:sp>
         <p:nvSpPr>
-          <p:cNvPr id="528896217" name="Titelplatzhalter 25"/>
+          <p:cNvPr id="211939002" name="Titelplatzhalter 25"/>
           <p:cNvSpPr>
             <a:spLocks noGrp="1"/>
           </p:cNvSpPr>
@@ -4940,7 +4940,7 @@
       </p:sp>
       <p:sp>
         <p:nvSpPr>
-          <p:cNvPr id="2121347390" name="Bildplatzhalter 2"/>
+          <p:cNvPr id="1520365714" name="Bildplatzhalter 2"/>
           <p:cNvSpPr>
             <a:spLocks noGrp="1"/>
           </p:cNvSpPr>
@@ -4982,7 +4982,7 @@
       </p:sp>
       <p:sp>
         <p:nvSpPr>
-          <p:cNvPr id="1976295577" name="Bildplatzhalter 2"/>
+          <p:cNvPr id="1374214044" name="Bildplatzhalter 2"/>
           <p:cNvSpPr>
             <a:spLocks noGrp="1"/>
           </p:cNvSpPr>
@@ -5024,7 +5024,7 @@
       </p:sp>
       <p:sp>
         <p:nvSpPr>
-          <p:cNvPr id="1585714652" name="Bildplatzhalter 2"/>
+          <p:cNvPr id="135884446" name="Bildplatzhalter 2"/>
           <p:cNvSpPr>
             <a:spLocks noGrp="1"/>
           </p:cNvSpPr>
@@ -5066,7 +5066,7 @@
       </p:sp>
       <p:sp>
         <p:nvSpPr>
-          <p:cNvPr id="386317488" name="Textplatzhalter 7"/>
+          <p:cNvPr id="1600419347" name="Textplatzhalter 7"/>
           <p:cNvSpPr>
             <a:spLocks noGrp="1"/>
           </p:cNvSpPr>
@@ -5163,7 +5163,7 @@
       </p:grpSpPr>
       <p:sp>
         <p:nvSpPr>
-          <p:cNvPr id="1205456282" name="Titel 3"/>
+          <p:cNvPr id="1545995111" name="Titel 3"/>
           <p:cNvSpPr>
             <a:spLocks noGrp="1"/>
           </p:cNvSpPr>
@@ -5231,7 +5231,7 @@
       </p:sp>
       <p:sp>
         <p:nvSpPr>
-          <p:cNvPr id="179540728" name="Textplatzhalter 7"/>
+          <p:cNvPr id="1070699096" name="Textplatzhalter 7"/>
           <p:cNvSpPr>
             <a:spLocks noGrp="1"/>
           </p:cNvSpPr>
@@ -5303,7 +5303,7 @@
       </p:sp>
       <p:sp>
         <p:nvSpPr>
-          <p:cNvPr id="1599791089" name="Textplatzhalter 7"/>
+          <p:cNvPr id="2080246411" name="Textplatzhalter 7"/>
           <p:cNvSpPr>
             <a:spLocks noGrp="1"/>
           </p:cNvSpPr>
@@ -5435,7 +5435,7 @@
       </p:grpSpPr>
       <p:sp>
         <p:nvSpPr>
-          <p:cNvPr id="615181189" name="Titel 3"/>
+          <p:cNvPr id="143929972" name="Titel 3"/>
           <p:cNvSpPr>
             <a:spLocks noGrp="1"/>
           </p:cNvSpPr>
@@ -5503,7 +5503,7 @@
       </p:sp>
       <p:sp>
         <p:nvSpPr>
-          <p:cNvPr id="458260722" name="Textplatzhalter 7"/>
+          <p:cNvPr id="1488587892" name="Textplatzhalter 7"/>
           <p:cNvSpPr>
             <a:spLocks noGrp="1"/>
           </p:cNvSpPr>
@@ -5575,7 +5575,7 @@
       </p:sp>
       <p:sp>
         <p:nvSpPr>
-          <p:cNvPr id="311285520" name="Bildplatzhalter 2"/>
+          <p:cNvPr id="291246296" name="Bildplatzhalter 2"/>
           <p:cNvSpPr>
             <a:spLocks noGrp="1"/>
           </p:cNvSpPr>
@@ -5617,7 +5617,7 @@
       </p:sp>
       <p:sp>
         <p:nvSpPr>
-          <p:cNvPr id="1870316526" name="Textplatzhalter 7"/>
+          <p:cNvPr id="1296774654" name="Textplatzhalter 7"/>
           <p:cNvSpPr>
             <a:spLocks noGrp="1"/>
           </p:cNvSpPr>
@@ -5749,7 +5749,7 @@
       </p:grpSpPr>
       <p:sp>
         <p:nvSpPr>
-          <p:cNvPr id="1154363680" name="Titel 3"/>
+          <p:cNvPr id="1310204997" name="Titel 3"/>
           <p:cNvSpPr>
             <a:spLocks noGrp="1"/>
           </p:cNvSpPr>
@@ -5823,7 +5823,7 @@
       </p:sp>
       <p:sp>
         <p:nvSpPr>
-          <p:cNvPr id="1608173943" name="Textplatzhalter 7"/>
+          <p:cNvPr id="2118504504" name="Textplatzhalter 7"/>
           <p:cNvSpPr>
             <a:spLocks noGrp="1"/>
           </p:cNvSpPr>
@@ -5895,7 +5895,7 @@
       </p:sp>
       <p:sp>
         <p:nvSpPr>
-          <p:cNvPr id="1389768882" name="Bildplatzhalter 2"/>
+          <p:cNvPr id="1198469972" name="Bildplatzhalter 2"/>
           <p:cNvSpPr>
             <a:spLocks noGrp="1"/>
           </p:cNvSpPr>
@@ -5937,7 +5937,7 @@
       </p:sp>
       <p:sp>
         <p:nvSpPr>
-          <p:cNvPr id="1451155955" name="Textplatzhalter 7"/>
+          <p:cNvPr id="280927540" name="Textplatzhalter 7"/>
           <p:cNvSpPr>
             <a:spLocks noGrp="1"/>
           </p:cNvSpPr>
@@ -6014,7 +6014,7 @@
       </p:sp>
       <p:sp>
         <p:nvSpPr>
-          <p:cNvPr id="1947120106" name="Bildplatzhalter 2"/>
+          <p:cNvPr id="987999972" name="Bildplatzhalter 2"/>
           <p:cNvSpPr>
             <a:spLocks noGrp="1"/>
           </p:cNvSpPr>
@@ -6056,7 +6056,7 @@
       </p:sp>
       <p:sp>
         <p:nvSpPr>
-          <p:cNvPr id="1221389607" name="Textplatzhalter 7"/>
+          <p:cNvPr id="159067157" name="Textplatzhalter 7"/>
           <p:cNvSpPr>
             <a:spLocks noGrp="1"/>
           </p:cNvSpPr>
@@ -6158,7 +6158,7 @@
       </p:grpSpPr>
       <p:sp>
         <p:nvSpPr>
-          <p:cNvPr id="63391354" name="Titel 3"/>
+          <p:cNvPr id="1237916813" name="Titel 3"/>
           <p:cNvSpPr>
             <a:spLocks noGrp="1"/>
           </p:cNvSpPr>
@@ -6232,7 +6232,7 @@
       </p:sp>
       <p:sp>
         <p:nvSpPr>
-          <p:cNvPr id="547369039" name="Textplatzhalter 7"/>
+          <p:cNvPr id="967853929" name="Textplatzhalter 7"/>
           <p:cNvSpPr>
             <a:spLocks noGrp="1"/>
           </p:cNvSpPr>
@@ -6304,7 +6304,7 @@
       </p:sp>
       <p:sp>
         <p:nvSpPr>
-          <p:cNvPr id="586505534" name="Bildplatzhalter 2"/>
+          <p:cNvPr id="1955037915" name="Bildplatzhalter 2"/>
           <p:cNvSpPr>
             <a:spLocks noGrp="1"/>
           </p:cNvSpPr>
@@ -6346,7 +6346,7 @@
       </p:sp>
       <p:sp>
         <p:nvSpPr>
-          <p:cNvPr id="1078954171" name="Textplatzhalter 7"/>
+          <p:cNvPr id="1635137572" name="Textplatzhalter 7"/>
           <p:cNvSpPr>
             <a:spLocks noGrp="1"/>
           </p:cNvSpPr>
@@ -6478,7 +6478,7 @@
       </p:grpSpPr>
       <p:sp>
         <p:nvSpPr>
-          <p:cNvPr id="827876741" name="Titel 3"/>
+          <p:cNvPr id="2061041261" name="Titel 3"/>
           <p:cNvSpPr>
             <a:spLocks noGrp="1"/>
           </p:cNvSpPr>
@@ -6518,7 +6518,7 @@
       </p:sp>
       <p:sp>
         <p:nvSpPr>
-          <p:cNvPr id="974306455" name="Bildplatzhalter 4"/>
+          <p:cNvPr id="1388537457" name="Bildplatzhalter 4"/>
           <p:cNvSpPr>
             <a:spLocks noGrp="1"/>
           </p:cNvSpPr>
@@ -6562,7 +6562,7 @@
       </p:sp>
       <p:sp>
         <p:nvSpPr>
-          <p:cNvPr id="1071001524" name="Textplatzhalter 7"/>
+          <p:cNvPr id="876403636" name="Textplatzhalter 7"/>
           <p:cNvSpPr>
             <a:spLocks noGrp="1"/>
           </p:cNvSpPr>
@@ -6634,7 +6634,7 @@
       </p:sp>
       <p:sp>
         <p:nvSpPr>
-          <p:cNvPr id="1379931945" name="Textplatzhalter 7"/>
+          <p:cNvPr id="1503695725" name="Textplatzhalter 7"/>
           <p:cNvSpPr>
             <a:spLocks noGrp="1"/>
           </p:cNvSpPr>
@@ -6773,7 +6773,7 @@
       </p:grpSpPr>
       <p:sp>
         <p:nvSpPr>
-          <p:cNvPr id="1418842135" name="Rechteck 8"/>
+          <p:cNvPr id="1633315859" name="Rechteck 8"/>
           <p:cNvSpPr/>
           <p:nvPr userDrawn="1"/>
         </p:nvSpPr>
@@ -6821,7 +6821,7 @@
       </p:sp>
       <p:cxnSp>
         <p:nvCxnSpPr>
-          <p:cNvPr id="193000598" name="Gerader Verbinder 13"/>
+          <p:cNvPr id="479672750" name="Gerader Verbinder 13"/>
           <p:cNvCxnSpPr/>
           <p:nvPr userDrawn="1"/>
         </p:nvCxnSpPr>
@@ -6856,7 +6856,7 @@
       </p:cxnSp>
       <p:cxnSp>
         <p:nvCxnSpPr>
-          <p:cNvPr id="207430490" name="Gerader Verbinder 9"/>
+          <p:cNvPr id="402574443" name="Gerader Verbinder 9"/>
           <p:cNvCxnSpPr/>
           <p:nvPr userDrawn="1"/>
         </p:nvCxnSpPr>
@@ -6893,7 +6893,7 @@
       </p:cxnSp>
       <p:sp>
         <p:nvSpPr>
-          <p:cNvPr id="1477085389" name="Rectangle 4"/>
+          <p:cNvPr id="1169116805" name="Rectangle 4"/>
           <p:cNvSpPr txBox="1">
             <a:spLocks noChangeArrowheads="1"/>
           </p:cNvSpPr>
@@ -7124,7 +7124,7 @@
       </p:sp>
       <p:sp>
         <p:nvSpPr>
-          <p:cNvPr id="631998909" name="Rectangle 5"/>
+          <p:cNvPr id="1155119534" name="Rectangle 5"/>
           <p:cNvSpPr txBox="1">
             <a:spLocks noChangeArrowheads="1"/>
           </p:cNvSpPr>
@@ -7290,7 +7290,7 @@
       </p:sp>
       <p:pic>
         <p:nvPicPr>
-          <p:cNvPr id="336802870" name="Grafik 2" title="Logo der TU Chemnitz mit Bezug zur Kulturhauptstadt 2025"/>
+          <p:cNvPr id="530913300" name="Grafik 2" title="Logo der TU Chemnitz mit Bezug zur Kulturhauptstadt 2025"/>
           <p:cNvPicPr>
             <a:picLocks noChangeAspect="1"/>
           </p:cNvPicPr>
@@ -7731,7 +7731,7 @@
       </p:grpSpPr>
       <p:sp>
         <p:nvSpPr>
-          <p:cNvPr id="1188753124" name="Rechteck 8"/>
+          <p:cNvPr id="1013241752" name="Rechteck 8"/>
           <p:cNvSpPr/>
           <p:nvPr userDrawn="1"/>
         </p:nvSpPr>
@@ -7779,7 +7779,7 @@
       </p:sp>
       <p:cxnSp>
         <p:nvCxnSpPr>
-          <p:cNvPr id="1618948822" name="Gerader Verbinder 10"/>
+          <p:cNvPr id="650464886" name="Gerader Verbinder 10"/>
           <p:cNvCxnSpPr/>
           <p:nvPr userDrawn="1"/>
         </p:nvCxnSpPr>
@@ -7814,7 +7814,7 @@
       </p:cxnSp>
       <p:cxnSp>
         <p:nvCxnSpPr>
-          <p:cNvPr id="296220284" name="Gerader Verbinder 32"/>
+          <p:cNvPr id="830367929" name="Gerader Verbinder 32"/>
           <p:cNvCxnSpPr/>
           <p:nvPr userDrawn="1"/>
         </p:nvCxnSpPr>
@@ -7851,7 +7851,7 @@
       </p:cxnSp>
       <p:sp>
         <p:nvSpPr>
-          <p:cNvPr id="48865971" name="Rectangle 5"/>
+          <p:cNvPr id="1784100576" name="Rectangle 5"/>
           <p:cNvSpPr txBox="1">
             <a:spLocks noChangeArrowheads="1"/>
           </p:cNvSpPr>
@@ -8017,7 +8017,7 @@
       </p:sp>
       <p:sp>
         <p:nvSpPr>
-          <p:cNvPr id="587770209" name="Fußzeilenplatzhalter 4"/>
+          <p:cNvPr id="2032284800" name="Fußzeilenplatzhalter 4"/>
           <p:cNvSpPr txBox="1"/>
           <p:nvPr userDrawn="1"/>
         </p:nvSpPr>
@@ -8177,7 +8177,7 @@
       </p:sp>
       <p:sp>
         <p:nvSpPr>
-          <p:cNvPr id="1098128344" name="Rectangle 4"/>
+          <p:cNvPr id="1023199308" name="Rectangle 4"/>
           <p:cNvSpPr txBox="1">
             <a:spLocks noChangeArrowheads="1"/>
           </p:cNvSpPr>
@@ -8347,7 +8347,7 @@
       </p:sp>
       <p:pic>
         <p:nvPicPr>
-          <p:cNvPr id="994205390" name="Grafik 9" title="Logo der TU Chemnitz mit Bezug zur Kulturhauptstadt 2025"/>
+          <p:cNvPr id="1035762634" name="Grafik 9" title="Logo der TU Chemnitz mit Bezug zur Kulturhauptstadt 2025"/>
           <p:cNvPicPr>
             <a:picLocks noChangeAspect="1"/>
           </p:cNvPicPr>
@@ -8680,7 +8680,7 @@
       </p:grpSpPr>
       <p:sp>
         <p:nvSpPr>
-          <p:cNvPr id="2144370436" name="Titel 1"/>
+          <p:cNvPr id="604370026" name="Titel 1"/>
           <p:cNvSpPr>
             <a:spLocks noGrp="1"/>
           </p:cNvSpPr>
@@ -8688,12 +8688,7 @@
             <p:ph type="title"/>
           </p:nvPr>
         </p:nvSpPr>
-        <p:spPr bwMode="auto">
-          <a:xfrm flipH="0" flipV="0">
-            <a:off x="2279382" y="266699"/>
-            <a:ext cx="9377469" cy="776226"/>
-          </a:xfrm>
-        </p:spPr>
+        <p:spPr bwMode="auto"/>
         <p:txBody>
           <a:bodyPr vertOverflow="overflow" horzOverflow="overflow" vert="horz" wrap="square" lIns="0" tIns="0" rIns="0" bIns="0" numCol="1" spcCol="0" rtlCol="0" fromWordArt="0" anchor="t" anchorCtr="0" forceAA="0" upright="0" compatLnSpc="0">
             <a:normAutofit fontScale="95000" lnSpcReduction="1000"/>
@@ -8739,78 +8734,28 @@
           </a:p>
         </p:txBody>
       </p:sp>
-      <p:sp>
-        <p:nvSpPr>
-          <p:cNvPr id="202846068" name="Textplatzhalter 7"/>
-          <p:cNvSpPr>
-            <a:spLocks noGrp="1"/>
-          </p:cNvSpPr>
-          <p:nvPr>
-            <p:ph type="body" sz="quarter" idx="13"/>
-          </p:nvPr>
-        </p:nvSpPr>
+      <p:pic>
+        <p:nvPicPr>
+          <p:cNvPr id="2010105430" name=""/>
+          <p:cNvPicPr>
+            <a:picLocks noChangeAspect="1"/>
+          </p:cNvPicPr>
+          <p:nvPr/>
+        </p:nvPicPr>
+        <p:blipFill rotWithShape="1">
+          <a:blip r:embed="rId3"/>
+          <a:stretch/>
+        </p:blipFill>
         <p:spPr bwMode="auto">
-          <a:xfrm>
-            <a:off x="334962" y="1776094"/>
-            <a:ext cx="11556999" cy="448944"/>
+          <a:xfrm flipH="0" flipV="0">
+            <a:off x="1499376" y="1693333"/>
+            <a:ext cx="9193247" cy="4487333"/>
           </a:xfrm>
           <a:prstGeom prst="rect">
             <a:avLst/>
           </a:prstGeom>
         </p:spPr>
-        <p:txBody>
-          <a:bodyPr vertOverflow="overflow" horzOverflow="overflow" vert="horz" wrap="square" lIns="0" tIns="0" rIns="0" bIns="0" numCol="1" spcCol="0" rtlCol="0" fromWordArt="0" anchor="t" anchorCtr="0" forceAA="0" upright="0" compatLnSpc="0">
-            <a:normAutofit/>
-          </a:bodyPr>
-          <a:lstStyle>
-            <a:lvl1pPr marL="0" indent="0">
-              <a:buFont typeface="Arial"/>
-              <a:buNone/>
-              <a:defRPr sz="2400" b="1">
-                <a:solidFill>
-                  <a:schemeClr val="tx1"/>
-                </a:solidFill>
-                <a:latin typeface="Roboto"/>
-                <a:ea typeface="Roboto"/>
-              </a:defRPr>
-            </a:lvl1pPr>
-            <a:lvl2pPr>
-              <a:defRPr sz="2400">
-                <a:latin typeface="Roboto"/>
-                <a:ea typeface="Roboto"/>
-              </a:defRPr>
-            </a:lvl2pPr>
-            <a:lvl3pPr>
-              <a:defRPr sz="2000">
-                <a:latin typeface="Roboto"/>
-                <a:ea typeface="Roboto"/>
-              </a:defRPr>
-            </a:lvl3pPr>
-            <a:lvl4pPr>
-              <a:defRPr sz="2000">
-                <a:latin typeface="Roboto"/>
-                <a:ea typeface="Roboto"/>
-              </a:defRPr>
-            </a:lvl4pPr>
-            <a:lvl5pPr>
-              <a:defRPr sz="2000">
-                <a:latin typeface="Roboto"/>
-                <a:ea typeface="Roboto"/>
-              </a:defRPr>
-            </a:lvl5pPr>
-          </a:lstStyle>
-          <a:p>
-            <a:pPr>
-              <a:defRPr/>
-            </a:pPr>
-            <a:r>
-              <a:rPr/>
-              <a:t>Teil 1: Vorestllung der Ergebnisse</a:t>
-            </a:r>
-            <a:endParaRPr/>
-          </a:p>
-        </p:txBody>
-      </p:sp>
+      </p:pic>
     </p:spTree>
   </p:cSld>
   <p:clrMapOvr>
@@ -8846,7 +8791,7 @@
       </p:grpSpPr>
       <p:sp>
         <p:nvSpPr>
-          <p:cNvPr id="1250716137" name="Titel 3"/>
+          <p:cNvPr id="1980992259" name="Titel 3"/>
           <p:cNvSpPr>
             <a:spLocks noGrp="1"/>
           </p:cNvSpPr>
@@ -8912,7 +8857,7 @@
       </p:sp>
       <p:sp>
         <p:nvSpPr>
-          <p:cNvPr id="1607728860" name="Textplatzhalter 7"/>
+          <p:cNvPr id="1942365547" name="Textplatzhalter 7"/>
           <p:cNvSpPr>
             <a:spLocks noGrp="1"/>
           </p:cNvSpPr>
@@ -9006,7 +8951,7 @@
       </p:sp>
       <p:pic>
         <p:nvPicPr>
-          <p:cNvPr id="1589589146" name=""/>
+          <p:cNvPr id="395505360" name=""/>
           <p:cNvPicPr>
             <a:picLocks noChangeAspect="1"/>
           </p:cNvPicPr>
@@ -9072,7 +9017,7 @@
       </p:grpSpPr>
       <p:sp>
         <p:nvSpPr>
-          <p:cNvPr id="323407118" name="Titel 3"/>
+          <p:cNvPr id="65147535" name="Titel 3"/>
           <p:cNvSpPr>
             <a:spLocks noGrp="1"/>
           </p:cNvSpPr>
@@ -9083,7 +9028,7 @@
         <p:spPr bwMode="auto">
           <a:xfrm>
             <a:off x="1343025" y="76896"/>
-            <a:ext cx="10656886" cy="468312"/>
+            <a:ext cx="10656885" cy="468312"/>
           </a:xfrm>
           <a:prstGeom prst="rect">
             <a:avLst/>
@@ -9138,7 +9083,7 @@
       </p:sp>
       <p:sp>
         <p:nvSpPr>
-          <p:cNvPr id="1665814477" name="Textplatzhalter 7"/>
+          <p:cNvPr id="81096580" name="Textplatzhalter 7"/>
           <p:cNvSpPr>
             <a:spLocks noGrp="1"/>
           </p:cNvSpPr>
@@ -9232,7 +9177,7 @@
       </p:sp>
       <p:pic>
         <p:nvPicPr>
-          <p:cNvPr id="1152196546" name=""/>
+          <p:cNvPr id="1995083070" name=""/>
           <p:cNvPicPr>
             <a:picLocks noChangeAspect="1"/>
           </p:cNvPicPr>
@@ -9298,7 +9243,7 @@
       </p:grpSpPr>
       <p:sp>
         <p:nvSpPr>
-          <p:cNvPr id="602013454" name="Titel 3"/>
+          <p:cNvPr id="1254711746" name="Titel 3"/>
           <p:cNvSpPr>
             <a:spLocks noGrp="1"/>
           </p:cNvSpPr>
@@ -9309,7 +9254,7 @@
         <p:spPr bwMode="auto">
           <a:xfrm>
             <a:off x="1343025" y="76896"/>
-            <a:ext cx="10656886" cy="468312"/>
+            <a:ext cx="10656885" cy="468312"/>
           </a:xfrm>
           <a:prstGeom prst="rect">
             <a:avLst/>
@@ -9364,7 +9309,7 @@
       </p:sp>
       <p:sp>
         <p:nvSpPr>
-          <p:cNvPr id="236685992" name="Textplatzhalter 7"/>
+          <p:cNvPr id="1330117706" name="Textplatzhalter 7"/>
           <p:cNvSpPr>
             <a:spLocks noGrp="1"/>
           </p:cNvSpPr>
@@ -9458,7 +9403,7 @@
       </p:sp>
       <p:pic>
         <p:nvPicPr>
-          <p:cNvPr id="1402262665" name=""/>
+          <p:cNvPr id="992232968" name=""/>
           <p:cNvPicPr>
             <a:picLocks noChangeAspect="1"/>
           </p:cNvPicPr>
@@ -9524,7 +9469,7 @@
       </p:grpSpPr>
       <p:sp>
         <p:nvSpPr>
-          <p:cNvPr id="2038753916" name="Titel 3"/>
+          <p:cNvPr id="92069430" name="Titel 3"/>
           <p:cNvSpPr>
             <a:spLocks noGrp="1"/>
           </p:cNvSpPr>
@@ -9535,7 +9480,7 @@
         <p:spPr bwMode="auto">
           <a:xfrm>
             <a:off x="1343025" y="76896"/>
-            <a:ext cx="10656886" cy="468312"/>
+            <a:ext cx="10656885" cy="468312"/>
           </a:xfrm>
           <a:prstGeom prst="rect">
             <a:avLst/>
@@ -9590,7 +9535,7 @@
       </p:sp>
       <p:sp>
         <p:nvSpPr>
-          <p:cNvPr id="123435933" name="Textplatzhalter 7"/>
+          <p:cNvPr id="1267462239" name="Textplatzhalter 7"/>
           <p:cNvSpPr>
             <a:spLocks noGrp="1"/>
           </p:cNvSpPr>
@@ -9684,7 +9629,7 @@
       </p:sp>
       <p:pic>
         <p:nvPicPr>
-          <p:cNvPr id="1574828115" name=""/>
+          <p:cNvPr id="1704638132" name=""/>
           <p:cNvPicPr>
             <a:picLocks noChangeAspect="1"/>
           </p:cNvPicPr>
@@ -9750,7 +9695,7 @@
       </p:grpSpPr>
       <p:sp>
         <p:nvSpPr>
-          <p:cNvPr id="583385420" name="Titel 3"/>
+          <p:cNvPr id="2001410455" name="Titel 3"/>
           <p:cNvSpPr>
             <a:spLocks noGrp="1"/>
           </p:cNvSpPr>
@@ -9761,7 +9706,7 @@
         <p:spPr bwMode="auto">
           <a:xfrm>
             <a:off x="1343025" y="76896"/>
-            <a:ext cx="10656886" cy="468312"/>
+            <a:ext cx="10656885" cy="468312"/>
           </a:xfrm>
           <a:prstGeom prst="rect">
             <a:avLst/>
@@ -9816,7 +9761,7 @@
       </p:sp>
       <p:sp>
         <p:nvSpPr>
-          <p:cNvPr id="609777278" name="Textplatzhalter 7"/>
+          <p:cNvPr id="1574011060" name="Textplatzhalter 7"/>
           <p:cNvSpPr>
             <a:spLocks noGrp="1"/>
           </p:cNvSpPr>
@@ -9910,7 +9855,7 @@
       </p:sp>
       <p:pic>
         <p:nvPicPr>
-          <p:cNvPr id="1427884564" name=""/>
+          <p:cNvPr id="1707319161" name=""/>
           <p:cNvPicPr>
             <a:picLocks noChangeAspect="1"/>
           </p:cNvPicPr>
@@ -9976,7 +9921,7 @@
       </p:grpSpPr>
       <p:sp>
         <p:nvSpPr>
-          <p:cNvPr id="473364414" name="Titel 3"/>
+          <p:cNvPr id="1347269045" name="Titel 3"/>
           <p:cNvSpPr>
             <a:spLocks noGrp="1"/>
           </p:cNvSpPr>
@@ -9987,7 +9932,7 @@
         <p:spPr bwMode="auto">
           <a:xfrm>
             <a:off x="1343025" y="76896"/>
-            <a:ext cx="10656886" cy="468312"/>
+            <a:ext cx="10656885" cy="468312"/>
           </a:xfrm>
           <a:prstGeom prst="rect">
             <a:avLst/>
@@ -10042,7 +9987,7 @@
       </p:sp>
       <p:sp>
         <p:nvSpPr>
-          <p:cNvPr id="1292451646" name="Textplatzhalter 7"/>
+          <p:cNvPr id="510675182" name="Textplatzhalter 7"/>
           <p:cNvSpPr>
             <a:spLocks noGrp="1"/>
           </p:cNvSpPr>
@@ -10136,7 +10081,7 @@
       </p:sp>
       <p:pic>
         <p:nvPicPr>
-          <p:cNvPr id="888307145" name=""/>
+          <p:cNvPr id="1365783979" name=""/>
           <p:cNvPicPr>
             <a:picLocks noChangeAspect="1"/>
           </p:cNvPicPr>
@@ -10144,7 +10089,7 @@
         </p:nvPicPr>
         <p:blipFill rotWithShape="1">
           <a:blip r:embed="rId3"/>
-          <a:srcRect l="47865" t="67285" r="13133" b="1980"/>
+          <a:srcRect l="47865" t="67285" r="13132" b="1980"/>
           <a:stretch/>
         </p:blipFill>
         <p:spPr bwMode="auto">
@@ -10202,7 +10147,7 @@
       </p:grpSpPr>
       <p:sp>
         <p:nvSpPr>
-          <p:cNvPr id="2132439323" name="Titel 3"/>
+          <p:cNvPr id="1687877711" name="Titel 3"/>
           <p:cNvSpPr>
             <a:spLocks noGrp="1"/>
           </p:cNvSpPr>
@@ -10213,7 +10158,7 @@
         <p:spPr bwMode="auto">
           <a:xfrm>
             <a:off x="1343025" y="76896"/>
-            <a:ext cx="10656886" cy="468312"/>
+            <a:ext cx="10656885" cy="468312"/>
           </a:xfrm>
           <a:prstGeom prst="rect">
             <a:avLst/>
@@ -10268,7 +10213,7 @@
       </p:sp>
       <p:sp>
         <p:nvSpPr>
-          <p:cNvPr id="1733563583" name="Textplatzhalter 7"/>
+          <p:cNvPr id="904362422" name="Textplatzhalter 7"/>
           <p:cNvSpPr>
             <a:spLocks noGrp="1"/>
           </p:cNvSpPr>
@@ -10362,7 +10307,7 @@
       </p:sp>
       <p:pic>
         <p:nvPicPr>
-          <p:cNvPr id="1714593566" name=""/>
+          <p:cNvPr id="1266758555" name=""/>
           <p:cNvPicPr>
             <a:picLocks noChangeAspect="1"/>
           </p:cNvPicPr>
@@ -10428,7 +10373,7 @@
       </p:grpSpPr>
       <p:sp>
         <p:nvSpPr>
-          <p:cNvPr id="1608421527" name="Titel 3"/>
+          <p:cNvPr id="1734503331" name="Titel 3"/>
           <p:cNvSpPr>
             <a:spLocks noGrp="1"/>
           </p:cNvSpPr>
@@ -10439,7 +10384,7 @@
         <p:spPr bwMode="auto">
           <a:xfrm>
             <a:off x="1343025" y="76896"/>
-            <a:ext cx="10656886" cy="468312"/>
+            <a:ext cx="10656885" cy="468312"/>
           </a:xfrm>
           <a:prstGeom prst="rect">
             <a:avLst/>
@@ -10494,7 +10439,7 @@
       </p:sp>
       <p:sp>
         <p:nvSpPr>
-          <p:cNvPr id="267221315" name="Textplatzhalter 7"/>
+          <p:cNvPr id="2000463171" name="Textplatzhalter 7"/>
           <p:cNvSpPr>
             <a:spLocks noGrp="1"/>
           </p:cNvSpPr>
@@ -10568,7 +10513,7 @@
       </p:sp>
       <p:pic>
         <p:nvPicPr>
-          <p:cNvPr id="695053450" name=""/>
+          <p:cNvPr id="735834926" name=""/>
           <p:cNvPicPr>
             <a:picLocks noChangeAspect="1"/>
           </p:cNvPicPr>
@@ -10634,7 +10579,7 @@
       </p:grpSpPr>
       <p:sp>
         <p:nvSpPr>
-          <p:cNvPr id="1848637019" name="Titel 3"/>
+          <p:cNvPr id="137393316" name="Titel 3"/>
           <p:cNvSpPr>
             <a:spLocks noGrp="1"/>
           </p:cNvSpPr>
@@ -10645,7 +10590,7 @@
         <p:spPr bwMode="auto">
           <a:xfrm>
             <a:off x="1343025" y="76896"/>
-            <a:ext cx="10656886" cy="468312"/>
+            <a:ext cx="10656885" cy="468312"/>
           </a:xfrm>
           <a:prstGeom prst="rect">
             <a:avLst/>
@@ -10700,7 +10645,7 @@
       </p:sp>
       <p:sp>
         <p:nvSpPr>
-          <p:cNvPr id="1685579874" name="Textplatzhalter 7"/>
+          <p:cNvPr id="1354155160" name="Textplatzhalter 7"/>
           <p:cNvSpPr>
             <a:spLocks noGrp="1"/>
           </p:cNvSpPr>
@@ -10774,7 +10719,7 @@
       </p:sp>
       <p:pic>
         <p:nvPicPr>
-          <p:cNvPr id="1265063018" name=""/>
+          <p:cNvPr id="1451482111" name=""/>
           <p:cNvPicPr>
             <a:picLocks noChangeAspect="1"/>
           </p:cNvPicPr>
@@ -10782,7 +10727,7 @@
         </p:nvPicPr>
         <p:blipFill rotWithShape="1">
           <a:blip r:embed="rId3"/>
-          <a:srcRect l="-5" t="0" r="52138" b="17154"/>
+          <a:srcRect l="-5" t="0" r="52138" b="17152"/>
           <a:stretch/>
         </p:blipFill>
         <p:spPr bwMode="auto">
@@ -10840,7 +10785,7 @@
       </p:grpSpPr>
       <p:sp>
         <p:nvSpPr>
-          <p:cNvPr id="430455928" name="Titel 3"/>
+          <p:cNvPr id="961543550" name="Titel 3"/>
           <p:cNvSpPr>
             <a:spLocks noGrp="1"/>
           </p:cNvSpPr>
@@ -10851,7 +10796,7 @@
         <p:spPr bwMode="auto">
           <a:xfrm>
             <a:off x="1343025" y="76896"/>
-            <a:ext cx="10656886" cy="468312"/>
+            <a:ext cx="10656885" cy="468312"/>
           </a:xfrm>
           <a:prstGeom prst="rect">
             <a:avLst/>
@@ -10906,7 +10851,7 @@
       </p:sp>
       <p:sp>
         <p:nvSpPr>
-          <p:cNvPr id="121324085" name="Textplatzhalter 7"/>
+          <p:cNvPr id="2054832413" name="Textplatzhalter 7"/>
           <p:cNvSpPr>
             <a:spLocks noGrp="1"/>
           </p:cNvSpPr>
@@ -10980,7 +10925,7 @@
       </p:sp>
       <p:pic>
         <p:nvPicPr>
-          <p:cNvPr id="1557919098" name=""/>
+          <p:cNvPr id="1855440171" name=""/>
           <p:cNvPicPr>
             <a:picLocks noChangeAspect="1"/>
           </p:cNvPicPr>
@@ -11046,7 +10991,7 @@
       </p:grpSpPr>
       <p:sp>
         <p:nvSpPr>
-          <p:cNvPr id="36617532" name="Titel 3"/>
+          <p:cNvPr id="821107604" name="Titel 3"/>
           <p:cNvSpPr>
             <a:spLocks noGrp="1"/>
           </p:cNvSpPr>
@@ -11118,7 +11063,7 @@
       </p:sp>
       <p:sp>
         <p:nvSpPr>
-          <p:cNvPr id="1599322518" name="Textplatzhalter 2"/>
+          <p:cNvPr id="320290463" name="Textplatzhalter 2"/>
           <p:cNvSpPr>
             <a:spLocks noGrp="1"/>
           </p:cNvSpPr>
@@ -11193,7 +11138,7 @@
       </p:sp>
       <p:pic>
         <p:nvPicPr>
-          <p:cNvPr id="1477300756" name=""/>
+          <p:cNvPr id="2125175853" name=""/>
           <p:cNvPicPr>
             <a:picLocks noChangeAspect="1"/>
           </p:cNvPicPr>
@@ -11248,7 +11193,7 @@
       </p:grpSpPr>
       <p:sp>
         <p:nvSpPr>
-          <p:cNvPr id="515840044" name="Titel 3"/>
+          <p:cNvPr id="575065772" name="Titel 3"/>
           <p:cNvSpPr>
             <a:spLocks noGrp="1"/>
           </p:cNvSpPr>
@@ -11259,7 +11204,7 @@
         <p:spPr bwMode="auto">
           <a:xfrm>
             <a:off x="1343025" y="76896"/>
-            <a:ext cx="10656886" cy="468312"/>
+            <a:ext cx="10656885" cy="468312"/>
           </a:xfrm>
           <a:prstGeom prst="rect">
             <a:avLst/>
@@ -11314,7 +11259,7 @@
       </p:sp>
       <p:sp>
         <p:nvSpPr>
-          <p:cNvPr id="1882273248" name="Textplatzhalter 7"/>
+          <p:cNvPr id="2094889267" name="Textplatzhalter 7"/>
           <p:cNvSpPr>
             <a:spLocks noGrp="1"/>
           </p:cNvSpPr>
@@ -11430,7 +11375,7 @@
       </p:sp>
       <p:pic>
         <p:nvPicPr>
-          <p:cNvPr id="1625227040" name=""/>
+          <p:cNvPr id="1659116136" name=""/>
           <p:cNvPicPr>
             <a:picLocks noChangeAspect="1"/>
           </p:cNvPicPr>
@@ -11496,7 +11441,7 @@
       </p:grpSpPr>
       <p:sp>
         <p:nvSpPr>
-          <p:cNvPr id="1214509467" name="Titel 3"/>
+          <p:cNvPr id="1142975643" name="Titel 3"/>
           <p:cNvSpPr>
             <a:spLocks noGrp="1"/>
           </p:cNvSpPr>
@@ -11507,7 +11452,7 @@
         <p:spPr bwMode="auto">
           <a:xfrm>
             <a:off x="1343025" y="76896"/>
-            <a:ext cx="10656886" cy="468312"/>
+            <a:ext cx="10656885" cy="468312"/>
           </a:xfrm>
           <a:prstGeom prst="rect">
             <a:avLst/>
@@ -11562,7 +11507,7 @@
       </p:sp>
       <p:sp>
         <p:nvSpPr>
-          <p:cNvPr id="957741065" name="Textplatzhalter 7"/>
+          <p:cNvPr id="515974580" name="Textplatzhalter 7"/>
           <p:cNvSpPr>
             <a:spLocks noGrp="1"/>
           </p:cNvSpPr>
@@ -11678,7 +11623,7 @@
       </p:sp>
       <p:pic>
         <p:nvPicPr>
-          <p:cNvPr id="546338591" name=""/>
+          <p:cNvPr id="177143116" name=""/>
           <p:cNvPicPr>
             <a:picLocks noChangeAspect="1"/>
           </p:cNvPicPr>
@@ -11744,7 +11689,7 @@
       </p:grpSpPr>
       <p:sp>
         <p:nvSpPr>
-          <p:cNvPr id="1565041465" name="Titel 3"/>
+          <p:cNvPr id="99763703" name="Titel 3"/>
           <p:cNvSpPr>
             <a:spLocks noGrp="1"/>
           </p:cNvSpPr>
@@ -11755,7 +11700,7 @@
         <p:spPr bwMode="auto">
           <a:xfrm>
             <a:off x="1343025" y="76896"/>
-            <a:ext cx="10656886" cy="468312"/>
+            <a:ext cx="10656885" cy="468312"/>
           </a:xfrm>
           <a:prstGeom prst="rect">
             <a:avLst/>
@@ -11810,7 +11755,7 @@
       </p:sp>
       <p:sp>
         <p:nvSpPr>
-          <p:cNvPr id="2079878660" name="Textplatzhalter 7"/>
+          <p:cNvPr id="1645724142" name="Textplatzhalter 7"/>
           <p:cNvSpPr>
             <a:spLocks noGrp="1"/>
           </p:cNvSpPr>
@@ -11926,7 +11871,7 @@
       </p:sp>
       <p:pic>
         <p:nvPicPr>
-          <p:cNvPr id="570662271" name=""/>
+          <p:cNvPr id="1857600428" name=""/>
           <p:cNvPicPr>
             <a:picLocks noChangeAspect="1"/>
           </p:cNvPicPr>
@@ -11992,7 +11937,7 @@
       </p:grpSpPr>
       <p:sp>
         <p:nvSpPr>
-          <p:cNvPr id="405635283" name="Titel 3"/>
+          <p:cNvPr id="1375741142" name="Titel 3"/>
           <p:cNvSpPr>
             <a:spLocks noGrp="1"/>
           </p:cNvSpPr>
@@ -12003,7 +11948,7 @@
         <p:spPr bwMode="auto">
           <a:xfrm>
             <a:off x="1343025" y="76896"/>
-            <a:ext cx="10656886" cy="468312"/>
+            <a:ext cx="10656885" cy="468312"/>
           </a:xfrm>
           <a:prstGeom prst="rect">
             <a:avLst/>
@@ -12058,7 +12003,7 @@
       </p:sp>
       <p:sp>
         <p:nvSpPr>
-          <p:cNvPr id="284994909" name="Textplatzhalter 7"/>
+          <p:cNvPr id="1492407697" name="Textplatzhalter 7"/>
           <p:cNvSpPr>
             <a:spLocks noGrp="1"/>
           </p:cNvSpPr>
@@ -12174,7 +12119,7 @@
       </p:sp>
       <p:pic>
         <p:nvPicPr>
-          <p:cNvPr id="1154674354" name=""/>
+          <p:cNvPr id="1848013333" name=""/>
           <p:cNvPicPr>
             <a:picLocks noChangeAspect="1"/>
           </p:cNvPicPr>
@@ -12240,7 +12185,7 @@
       </p:grpSpPr>
       <p:sp>
         <p:nvSpPr>
-          <p:cNvPr id="1659423057" name="Titel 3"/>
+          <p:cNvPr id="1397478571" name="Titel 3"/>
           <p:cNvSpPr>
             <a:spLocks noGrp="1"/>
           </p:cNvSpPr>
@@ -12251,7 +12196,7 @@
         <p:spPr bwMode="auto">
           <a:xfrm>
             <a:off x="1343025" y="76896"/>
-            <a:ext cx="10656886" cy="468312"/>
+            <a:ext cx="10656885" cy="468312"/>
           </a:xfrm>
           <a:prstGeom prst="rect">
             <a:avLst/>
@@ -12306,7 +12251,7 @@
       </p:sp>
       <p:sp>
         <p:nvSpPr>
-          <p:cNvPr id="1698087822" name="Textplatzhalter 7"/>
+          <p:cNvPr id="1207136205" name="Textplatzhalter 7"/>
           <p:cNvSpPr>
             <a:spLocks noGrp="1"/>
           </p:cNvSpPr>
@@ -12422,7 +12367,7 @@
       </p:sp>
       <p:pic>
         <p:nvPicPr>
-          <p:cNvPr id="450444928" name=""/>
+          <p:cNvPr id="1292204267" name=""/>
           <p:cNvPicPr>
             <a:picLocks noChangeAspect="1"/>
           </p:cNvPicPr>
@@ -12490,7 +12435,7 @@
       </p:grpSpPr>
       <p:sp>
         <p:nvSpPr>
-          <p:cNvPr id="1852883609" name="Titel 3"/>
+          <p:cNvPr id="367743078" name="Titel 3"/>
           <p:cNvSpPr>
             <a:spLocks noGrp="1"/>
           </p:cNvSpPr>
@@ -12501,7 +12446,7 @@
         <p:spPr bwMode="auto">
           <a:xfrm>
             <a:off x="1343025" y="76896"/>
-            <a:ext cx="10656886" cy="468312"/>
+            <a:ext cx="10656885" cy="468312"/>
           </a:xfrm>
           <a:prstGeom prst="rect">
             <a:avLst/>
@@ -12556,7 +12501,7 @@
       </p:sp>
       <p:sp>
         <p:nvSpPr>
-          <p:cNvPr id="32075693" name="Textplatzhalter 7"/>
+          <p:cNvPr id="1726242757" name="Textplatzhalter 7"/>
           <p:cNvSpPr>
             <a:spLocks noGrp="1"/>
           </p:cNvSpPr>
@@ -12672,7 +12617,7 @@
       </p:sp>
       <p:pic>
         <p:nvPicPr>
-          <p:cNvPr id="1234882776" name=""/>
+          <p:cNvPr id="1945618531" name=""/>
           <p:cNvPicPr>
             <a:picLocks noChangeAspect="1"/>
           </p:cNvPicPr>
@@ -12741,7 +12686,7 @@
       </p:grpSpPr>
       <p:sp>
         <p:nvSpPr>
-          <p:cNvPr id="2048923576" name="Titel 3"/>
+          <p:cNvPr id="1780244268" name="Titel 3"/>
           <p:cNvSpPr>
             <a:spLocks noGrp="1"/>
           </p:cNvSpPr>
@@ -12752,7 +12697,7 @@
         <p:spPr bwMode="auto">
           <a:xfrm>
             <a:off x="1343025" y="76896"/>
-            <a:ext cx="10656886" cy="468312"/>
+            <a:ext cx="10656885" cy="468312"/>
           </a:xfrm>
           <a:prstGeom prst="rect">
             <a:avLst/>
@@ -12807,7 +12752,7 @@
       </p:sp>
       <p:sp>
         <p:nvSpPr>
-          <p:cNvPr id="1966099058" name="Textplatzhalter 7"/>
+          <p:cNvPr id="1171675947" name="Textplatzhalter 7"/>
           <p:cNvSpPr>
             <a:spLocks noGrp="1"/>
           </p:cNvSpPr>
@@ -12923,7 +12868,7 @@
       </p:sp>
       <p:pic>
         <p:nvPicPr>
-          <p:cNvPr id="229356970" name=""/>
+          <p:cNvPr id="626153697" name=""/>
           <p:cNvPicPr>
             <a:picLocks noChangeAspect="1"/>
           </p:cNvPicPr>
@@ -12992,7 +12937,7 @@
       </p:grpSpPr>
       <p:sp>
         <p:nvSpPr>
-          <p:cNvPr id="1249858558" name="Titel 3"/>
+          <p:cNvPr id="14181622" name="Titel 3"/>
           <p:cNvSpPr>
             <a:spLocks noGrp="1"/>
           </p:cNvSpPr>
@@ -13003,7 +12948,7 @@
         <p:spPr bwMode="auto">
           <a:xfrm>
             <a:off x="1343025" y="76896"/>
-            <a:ext cx="10656886" cy="468312"/>
+            <a:ext cx="10656885" cy="468312"/>
           </a:xfrm>
           <a:prstGeom prst="rect">
             <a:avLst/>
@@ -13058,7 +13003,7 @@
       </p:sp>
       <p:sp>
         <p:nvSpPr>
-          <p:cNvPr id="1534744690" name="Textplatzhalter 7"/>
+          <p:cNvPr id="2123509587" name="Textplatzhalter 7"/>
           <p:cNvSpPr>
             <a:spLocks noGrp="1"/>
           </p:cNvSpPr>
@@ -13174,7 +13119,7 @@
       </p:sp>
       <p:pic>
         <p:nvPicPr>
-          <p:cNvPr id="1310004722" name=""/>
+          <p:cNvPr id="1072418767" name=""/>
           <p:cNvPicPr>
             <a:picLocks noChangeAspect="1"/>
           </p:cNvPicPr>
@@ -13243,7 +13188,7 @@
       </p:grpSpPr>
       <p:sp>
         <p:nvSpPr>
-          <p:cNvPr id="206599454" name="Titel 3"/>
+          <p:cNvPr id="1258071125" name="Titel 3"/>
           <p:cNvSpPr>
             <a:spLocks noGrp="1"/>
           </p:cNvSpPr>
@@ -13254,7 +13199,7 @@
         <p:spPr bwMode="auto">
           <a:xfrm>
             <a:off x="1343025" y="76896"/>
-            <a:ext cx="10656886" cy="468312"/>
+            <a:ext cx="10656885" cy="468312"/>
           </a:xfrm>
           <a:prstGeom prst="rect">
             <a:avLst/>
@@ -13309,7 +13254,7 @@
       </p:sp>
       <p:sp>
         <p:nvSpPr>
-          <p:cNvPr id="1894875549" name="Textplatzhalter 7"/>
+          <p:cNvPr id="860992305" name="Textplatzhalter 7"/>
           <p:cNvSpPr>
             <a:spLocks noGrp="1"/>
           </p:cNvSpPr>
@@ -13425,7 +13370,7 @@
       </p:sp>
       <p:pic>
         <p:nvPicPr>
-          <p:cNvPr id="320890158" name=""/>
+          <p:cNvPr id="2028275313" name=""/>
           <p:cNvPicPr>
             <a:picLocks noChangeAspect="1"/>
           </p:cNvPicPr>
@@ -13494,7 +13439,7 @@
       </p:grpSpPr>
       <p:sp>
         <p:nvSpPr>
-          <p:cNvPr id="716065051" name="Titel 3"/>
+          <p:cNvPr id="466450819" name="Titel 3"/>
           <p:cNvSpPr>
             <a:spLocks noGrp="1"/>
           </p:cNvSpPr>
@@ -13505,7 +13450,7 @@
         <p:spPr bwMode="auto">
           <a:xfrm>
             <a:off x="1343025" y="76896"/>
-            <a:ext cx="10656886" cy="468312"/>
+            <a:ext cx="10656885" cy="468312"/>
           </a:xfrm>
           <a:prstGeom prst="rect">
             <a:avLst/>
@@ -13560,7 +13505,7 @@
       </p:sp>
       <p:sp>
         <p:nvSpPr>
-          <p:cNvPr id="1502657950" name="Textplatzhalter 7"/>
+          <p:cNvPr id="2079482039" name="Textplatzhalter 7"/>
           <p:cNvSpPr>
             <a:spLocks noGrp="1"/>
           </p:cNvSpPr>
@@ -13676,7 +13621,7 @@
       </p:sp>
       <p:pic>
         <p:nvPicPr>
-          <p:cNvPr id="1254929994" name=""/>
+          <p:cNvPr id="635647887" name=""/>
           <p:cNvPicPr>
             <a:picLocks noChangeAspect="1"/>
           </p:cNvPicPr>
@@ -13684,7 +13629,7 @@
         </p:nvPicPr>
         <p:blipFill rotWithShape="1">
           <a:blip r:embed="rId3"/>
-          <a:srcRect l="-438" t="62491" r="81056" b="18127"/>
+          <a:srcRect l="-438" t="62491" r="81056" b="18126"/>
           <a:stretch/>
         </p:blipFill>
         <p:spPr bwMode="auto">
@@ -13745,7 +13690,7 @@
       </p:grpSpPr>
       <p:sp>
         <p:nvSpPr>
-          <p:cNvPr id="619091400" name="Titel 3"/>
+          <p:cNvPr id="1828847296" name="Titel 3"/>
           <p:cNvSpPr>
             <a:spLocks noGrp="1"/>
           </p:cNvSpPr>
@@ -13811,7 +13756,7 @@
       </p:sp>
       <p:sp>
         <p:nvSpPr>
-          <p:cNvPr id="1875053915" name="Textplatzhalter 7"/>
+          <p:cNvPr id="2138694605" name="Textplatzhalter 7"/>
           <p:cNvSpPr>
             <a:spLocks noGrp="1"/>
           </p:cNvSpPr>
@@ -13881,7 +13826,7 @@
       </p:sp>
       <p:pic>
         <p:nvPicPr>
-          <p:cNvPr id="1707367748" name=""/>
+          <p:cNvPr id="1760064324" name=""/>
           <p:cNvPicPr>
             <a:picLocks noChangeAspect="1"/>
           </p:cNvPicPr>
@@ -13942,7 +13887,7 @@
       </p:grpSpPr>
       <p:sp>
         <p:nvSpPr>
-          <p:cNvPr id="20027393" name="Titel 3"/>
+          <p:cNvPr id="352004209" name="Titel 3"/>
           <p:cNvSpPr>
             <a:spLocks noGrp="1"/>
           </p:cNvSpPr>
@@ -13953,7 +13898,7 @@
         <p:spPr bwMode="auto">
           <a:xfrm>
             <a:off x="1343025" y="76896"/>
-            <a:ext cx="10656886" cy="468312"/>
+            <a:ext cx="10656885" cy="468312"/>
           </a:xfrm>
           <a:prstGeom prst="rect">
             <a:avLst/>
@@ -14008,7 +13953,7 @@
       </p:sp>
       <p:sp>
         <p:nvSpPr>
-          <p:cNvPr id="791891272" name="Textplatzhalter 7"/>
+          <p:cNvPr id="134810496" name="Textplatzhalter 7"/>
           <p:cNvSpPr>
             <a:spLocks noGrp="1"/>
           </p:cNvSpPr>
@@ -14124,7 +14069,7 @@
       </p:sp>
       <p:pic>
         <p:nvPicPr>
-          <p:cNvPr id="1295989785" name=""/>
+          <p:cNvPr id="957600152" name=""/>
           <p:cNvPicPr>
             <a:picLocks noChangeAspect="1"/>
           </p:cNvPicPr>
@@ -14132,7 +14077,7 @@
         </p:nvPicPr>
         <p:blipFill rotWithShape="1">
           <a:blip r:embed="rId3"/>
-          <a:srcRect l="42405" t="39785" r="946" b="3566"/>
+          <a:srcRect l="42405" t="39785" r="944" b="3566"/>
           <a:stretch/>
         </p:blipFill>
         <p:spPr bwMode="auto">
@@ -14193,7 +14138,7 @@
       </p:grpSpPr>
       <p:sp>
         <p:nvSpPr>
-          <p:cNvPr id="844870933" name="Titel 3"/>
+          <p:cNvPr id="986015081" name="Titel 3"/>
           <p:cNvSpPr>
             <a:spLocks noGrp="1"/>
           </p:cNvSpPr>
@@ -14204,7 +14149,7 @@
         <p:spPr bwMode="auto">
           <a:xfrm>
             <a:off x="1343025" y="76896"/>
-            <a:ext cx="10656886" cy="468312"/>
+            <a:ext cx="10656885" cy="468312"/>
           </a:xfrm>
           <a:prstGeom prst="rect">
             <a:avLst/>
@@ -14259,7 +14204,7 @@
       </p:sp>
       <p:sp>
         <p:nvSpPr>
-          <p:cNvPr id="312539064" name="Textplatzhalter 7"/>
+          <p:cNvPr id="1151387306" name="Textplatzhalter 7"/>
           <p:cNvSpPr>
             <a:spLocks noGrp="1"/>
           </p:cNvSpPr>
@@ -14375,7 +14320,7 @@
       </p:sp>
       <p:pic>
         <p:nvPicPr>
-          <p:cNvPr id="266650861" name=""/>
+          <p:cNvPr id="1797274292" name=""/>
           <p:cNvPicPr>
             <a:picLocks noChangeAspect="1"/>
           </p:cNvPicPr>
@@ -14444,7 +14389,7 @@
       </p:grpSpPr>
       <p:sp>
         <p:nvSpPr>
-          <p:cNvPr id="277134799" name="Titelplatzhalter 25"/>
+          <p:cNvPr id="657344022" name="Titelplatzhalter 25"/>
           <p:cNvSpPr>
             <a:spLocks noGrp="1"/>
           </p:cNvSpPr>
@@ -14522,7 +14467,7 @@
       </p:sp>
       <p:sp>
         <p:nvSpPr>
-          <p:cNvPr id="1530844176" name=""/>
+          <p:cNvPr id="597315589" name=""/>
           <p:cNvSpPr/>
           <p:nvPr/>
         </p:nvSpPr>
@@ -14568,7 +14513,7 @@
       </p:sp>
       <p:pic>
         <p:nvPicPr>
-          <p:cNvPr id="1587043114" name=""/>
+          <p:cNvPr id="790515549" name=""/>
           <p:cNvPicPr>
             <a:picLocks noChangeAspect="1"/>
           </p:cNvPicPr>
@@ -14623,7 +14568,7 @@
       </p:grpSpPr>
       <p:sp>
         <p:nvSpPr>
-          <p:cNvPr id="376952048" name="Titel 3"/>
+          <p:cNvPr id="389385841" name="Titel 3"/>
           <p:cNvSpPr>
             <a:spLocks noGrp="1"/>
           </p:cNvSpPr>
@@ -14695,7 +14640,7 @@
       </p:sp>
       <p:sp>
         <p:nvSpPr>
-          <p:cNvPr id="1583246893" name="Textplatzhalter 7"/>
+          <p:cNvPr id="436686799" name="Textplatzhalter 7"/>
           <p:cNvSpPr>
             <a:spLocks noGrp="1"/>
           </p:cNvSpPr>
@@ -14772,7 +14717,7 @@
       </p:sp>
       <p:sp>
         <p:nvSpPr>
-          <p:cNvPr id="497025852" name=""/>
+          <p:cNvPr id="63169097" name=""/>
           <p:cNvSpPr/>
           <p:nvPr/>
         </p:nvSpPr>
@@ -14808,7 +14753,7 @@
       </p:sp>
       <p:pic>
         <p:nvPicPr>
-          <p:cNvPr id="237458524" name=""/>
+          <p:cNvPr id="285121206" name=""/>
           <p:cNvPicPr>
             <a:picLocks noChangeAspect="1"/>
           </p:cNvPicPr>
@@ -14830,7 +14775,7 @@
       </p:pic>
       <p:pic>
         <p:nvPicPr>
-          <p:cNvPr id="570130986" name=""/>
+          <p:cNvPr id="966493898" name=""/>
           <p:cNvPicPr>
             <a:picLocks noChangeAspect="1"/>
           </p:cNvPicPr>
@@ -14852,7 +14797,7 @@
       </p:pic>
       <p:pic>
         <p:nvPicPr>
-          <p:cNvPr id="170429986" name=""/>
+          <p:cNvPr id="1571065000" name=""/>
           <p:cNvPicPr>
             <a:picLocks noChangeAspect="1"/>
           </p:cNvPicPr>
@@ -14874,9 +14819,9 @@
       </p:pic>
       <p:cxnSp>
         <p:nvCxnSpPr>
-          <p:cNvPr id="274642295" name=""/>
+          <p:cNvPr id="991916054" name=""/>
           <p:cNvCxnSpPr>
-            <a:stCxn id="237458524" idx="3"/>
+            <a:stCxn id="285121206" idx="3"/>
           </p:cNvCxnSpPr>
           <p:nvPr/>
         </p:nvCxnSpPr>
@@ -14916,16 +14861,16 @@
       </p:cxnSp>
       <p:cxnSp>
         <p:nvCxnSpPr>
-          <p:cNvPr id="750594548" name=""/>
+          <p:cNvPr id="724067191" name=""/>
           <p:cNvCxnSpPr>
-            <a:stCxn id="570130986" idx="3"/>
-            <a:endCxn id="170429986" idx="1"/>
+            <a:stCxn id="966493898" idx="3"/>
+            <a:endCxn id="1571065000" idx="1"/>
           </p:cNvCxnSpPr>
           <p:nvPr/>
         </p:nvCxnSpPr>
         <p:spPr bwMode="auto">
           <a:xfrm rot="0" flipH="0" flipV="0">
-            <a:off x="6724829" y="3541712"/>
+            <a:off x="6724828" y="3541712"/>
             <a:ext cx="1609544" cy="0"/>
           </a:xfrm>
           <a:prstGeom prst="line">
@@ -14992,7 +14937,7 @@
       </p:grpSpPr>
       <p:sp>
         <p:nvSpPr>
-          <p:cNvPr id="373087258" name="Titel 3"/>
+          <p:cNvPr id="932329605" name="Titel 3"/>
           <p:cNvSpPr>
             <a:spLocks noGrp="1"/>
           </p:cNvSpPr>
@@ -15072,7 +15017,7 @@
       </p:sp>
       <p:sp>
         <p:nvSpPr>
-          <p:cNvPr id="143401551" name="Textplatzhalter 7"/>
+          <p:cNvPr id="1002555600" name="Textplatzhalter 7"/>
           <p:cNvSpPr>
             <a:spLocks noGrp="1"/>
           </p:cNvSpPr>
@@ -15149,7 +15094,7 @@
       </p:sp>
       <p:pic>
         <p:nvPicPr>
-          <p:cNvPr id="364303505" name=""/>
+          <p:cNvPr id="1367626733" name=""/>
           <p:cNvPicPr>
             <a:picLocks noChangeAspect="1"/>
           </p:cNvPicPr>
@@ -15169,6 +15114,51 @@
           </a:prstGeom>
         </p:spPr>
       </p:pic>
+      <p:pic>
+        <p:nvPicPr>
+          <p:cNvPr id="535275534" name=""/>
+          <p:cNvPicPr>
+            <a:picLocks noChangeAspect="1"/>
+          </p:cNvPicPr>
+          <p:nvPr/>
+        </p:nvPicPr>
+        <p:blipFill rotWithShape="1">
+          <a:blip r:embed="rId4"/>
+          <a:stretch/>
+        </p:blipFill>
+        <p:spPr bwMode="auto">
+          <a:xfrm flipH="0" flipV="0">
+            <a:off x="587904" y="2614451"/>
+            <a:ext cx="3641195" cy="2035449"/>
+          </a:xfrm>
+          <a:prstGeom prst="rect">
+            <a:avLst/>
+          </a:prstGeom>
+        </p:spPr>
+      </p:pic>
+      <p:pic>
+        <p:nvPicPr>
+          <p:cNvPr id="110733941" name=""/>
+          <p:cNvPicPr>
+            <a:picLocks noChangeAspect="1"/>
+          </p:cNvPicPr>
+          <p:nvPr/>
+        </p:nvPicPr>
+        <p:blipFill rotWithShape="1">
+          <a:blip r:embed="rId5"/>
+          <a:srcRect l="0" t="14542" r="50165" b="0"/>
+          <a:stretch/>
+        </p:blipFill>
+        <p:spPr bwMode="auto">
+          <a:xfrm flipH="0" flipV="0">
+            <a:off x="8259231" y="2074333"/>
+            <a:ext cx="3328323" cy="3115687"/>
+          </a:xfrm>
+          <a:prstGeom prst="rect">
+            <a:avLst/>
+          </a:prstGeom>
+        </p:spPr>
+      </p:pic>
     </p:spTree>
   </p:cSld>
   <p:clrMapOvr>
@@ -15182,6 +15172,218 @@
       <p:transition advClick="1"/>
     </mc:Fallback>
   </mc:AlternateContent>
+  <p:timing>
+    <p:tnLst>
+      <p:par>
+        <p:cTn id="1" dur="indefinite" restart="never" nodeType="tmRoot">
+          <p:childTnLst>
+            <p:seq concurrent="1" nextAc="seek">
+              <p:cTn id="2" dur="indefinite" nodeType="mainSeq">
+                <p:childTnLst>
+                  <p:par>
+                    <p:cTn id="9" fill="hold">
+                      <p:stCondLst>
+                        <p:cond delay="indefinite"/>
+                      </p:stCondLst>
+                      <p:childTnLst>
+                        <p:par>
+                          <p:cTn id="10" fill="hold">
+                            <p:stCondLst>
+                              <p:cond delay="0"/>
+                            </p:stCondLst>
+                            <p:childTnLst>
+                              <p:par>
+                                <p:cTn id="11" presetID="2" presetClass="entr" presetSubtype="8" fill="hold" grpId="0" nodeType="clickEffect">
+                                  <p:stCondLst>
+                                    <p:cond delay="0"/>
+                                  </p:stCondLst>
+                                  <p:childTnLst>
+                                    <p:set>
+                                      <p:cBhvr>
+                                        <p:cTn id="14" dur="1" fill="hold">
+                                          <p:stCondLst>
+                                            <p:cond delay="0"/>
+                                          </p:stCondLst>
+                                        </p:cTn>
+                                        <p:tgtEl>
+                                          <p:spTgt spid="535275534"/>
+                                        </p:tgtEl>
+                                        <p:attrNameLst>
+                                          <p:attrName>style.visibility</p:attrName>
+                                        </p:attrNameLst>
+                                      </p:cBhvr>
+                                      <p:to>
+                                        <p:strVal val="visible"/>
+                                      </p:to>
+                                    </p:set>
+                                    <p:anim calcmode="lin" valueType="num">
+                                      <p:cBhvr additive="base">
+                                        <p:cTn id="13" dur="500" fill="hold"/>
+                                        <p:tgtEl>
+                                          <p:spTgt spid="535275534"/>
+                                        </p:tgtEl>
+                                        <p:attrNameLst>
+                                          <p:attrName>ppt_x</p:attrName>
+                                        </p:attrNameLst>
+                                      </p:cBhvr>
+                                      <p:tavLst>
+                                        <p:tav tm="0">
+                                          <p:val>
+                                            <p:strVal val="0-#ppt_w/2"/>
+                                          </p:val>
+                                        </p:tav>
+                                        <p:tav tm="100000">
+                                          <p:val>
+                                            <p:strVal val="#ppt_x"/>
+                                          </p:val>
+                                        </p:tav>
+                                      </p:tavLst>
+                                    </p:anim>
+                                    <p:anim calcmode="lin" valueType="num">
+                                      <p:cBhvr additive="base">
+                                        <p:cTn id="12" dur="500" fill="hold"/>
+                                        <p:tgtEl>
+                                          <p:spTgt spid="535275534"/>
+                                        </p:tgtEl>
+                                        <p:attrNameLst>
+                                          <p:attrName>ppt_y</p:attrName>
+                                        </p:attrNameLst>
+                                      </p:cBhvr>
+                                      <p:tavLst>
+                                        <p:tav tm="0">
+                                          <p:val>
+                                            <p:strVal val="#ppt_y"/>
+                                          </p:val>
+                                        </p:tav>
+                                        <p:tav tm="100000">
+                                          <p:val>
+                                            <p:strVal val="#ppt_y"/>
+                                          </p:val>
+                                        </p:tav>
+                                      </p:tavLst>
+                                    </p:anim>
+                                  </p:childTnLst>
+                                </p:cTn>
+                              </p:par>
+                            </p:childTnLst>
+                          </p:cTn>
+                        </p:par>
+                      </p:childTnLst>
+                    </p:cTn>
+                  </p:par>
+                  <p:par>
+                    <p:cTn id="3" fill="hold">
+                      <p:stCondLst>
+                        <p:cond delay="indefinite"/>
+                      </p:stCondLst>
+                      <p:childTnLst>
+                        <p:par>
+                          <p:cTn id="4" fill="hold">
+                            <p:stCondLst>
+                              <p:cond delay="0"/>
+                            </p:stCondLst>
+                            <p:childTnLst>
+                              <p:par>
+                                <p:cTn id="5" presetID="2" presetClass="entr" presetSubtype="2" fill="hold" grpId="0" nodeType="clickEffect">
+                                  <p:stCondLst>
+                                    <p:cond delay="0"/>
+                                  </p:stCondLst>
+                                  <p:childTnLst>
+                                    <p:set>
+                                      <p:cBhvr>
+                                        <p:cTn id="6" dur="1" fill="hold">
+                                          <p:stCondLst>
+                                            <p:cond delay="0"/>
+                                          </p:stCondLst>
+                                        </p:cTn>
+                                        <p:tgtEl>
+                                          <p:spTgt spid="110733941"/>
+                                        </p:tgtEl>
+                                        <p:attrNameLst>
+                                          <p:attrName>style.visibility</p:attrName>
+                                        </p:attrNameLst>
+                                      </p:cBhvr>
+                                      <p:to>
+                                        <p:strVal val="visible"/>
+                                      </p:to>
+                                    </p:set>
+                                    <p:anim calcmode="lin" valueType="num">
+                                      <p:cBhvr additive="base">
+                                        <p:cTn id="7" dur="500" fill="hold"/>
+                                        <p:tgtEl>
+                                          <p:spTgt spid="110733941"/>
+                                        </p:tgtEl>
+                                        <p:attrNameLst>
+                                          <p:attrName>ppt_x</p:attrName>
+                                        </p:attrNameLst>
+                                      </p:cBhvr>
+                                      <p:tavLst>
+                                        <p:tav tm="0">
+                                          <p:val>
+                                            <p:strVal val="1+#ppt_w/2"/>
+                                          </p:val>
+                                        </p:tav>
+                                        <p:tav tm="100000">
+                                          <p:val>
+                                            <p:strVal val="#ppt_x"/>
+                                          </p:val>
+                                        </p:tav>
+                                      </p:tavLst>
+                                    </p:anim>
+                                    <p:anim calcmode="lin" valueType="num">
+                                      <p:cBhvr additive="base">
+                                        <p:cTn id="8" dur="500" fill="hold"/>
+                                        <p:tgtEl>
+                                          <p:spTgt spid="110733941"/>
+                                        </p:tgtEl>
+                                        <p:attrNameLst>
+                                          <p:attrName>ppt_y</p:attrName>
+                                        </p:attrNameLst>
+                                      </p:cBhvr>
+                                      <p:tavLst>
+                                        <p:tav tm="0">
+                                          <p:val>
+                                            <p:strVal val="#ppt_y"/>
+                                          </p:val>
+                                        </p:tav>
+                                        <p:tav tm="100000">
+                                          <p:val>
+                                            <p:strVal val="#ppt_y"/>
+                                          </p:val>
+                                        </p:tav>
+                                      </p:tavLst>
+                                    </p:anim>
+                                  </p:childTnLst>
+                                </p:cTn>
+                              </p:par>
+                            </p:childTnLst>
+                          </p:cTn>
+                        </p:par>
+                      </p:childTnLst>
+                    </p:cTn>
+                  </p:par>
+                </p:childTnLst>
+              </p:cTn>
+              <p:prevCondLst>
+                <p:cond evt="onPrev" delay="0">
+                  <p:tgtEl>
+                    <p:sldTgt/>
+                  </p:tgtEl>
+                </p:cond>
+              </p:prevCondLst>
+              <p:nextCondLst>
+                <p:cond evt="onNext" delay="0">
+                  <p:tgtEl>
+                    <p:sldTgt/>
+                  </p:tgtEl>
+                </p:cond>
+              </p:nextCondLst>
+            </p:seq>
+          </p:childTnLst>
+        </p:cTn>
+      </p:par>
+    </p:tnLst>
+  </p:timing>
 </p:sld>
 </file>
 
@@ -15204,7 +15406,7 @@
       </p:grpSpPr>
       <p:sp>
         <p:nvSpPr>
-          <p:cNvPr id="1060757658" name="Titel 3"/>
+          <p:cNvPr id="416933399" name="Titel 3"/>
           <p:cNvSpPr>
             <a:spLocks noGrp="1"/>
           </p:cNvSpPr>
@@ -15288,7 +15490,7 @@
       </p:sp>
       <p:sp>
         <p:nvSpPr>
-          <p:cNvPr id="897955912" name="Textplatzhalter 7"/>
+          <p:cNvPr id="25092318" name="Textplatzhalter 7"/>
           <p:cNvSpPr>
             <a:spLocks noGrp="1"/>
           </p:cNvSpPr>
@@ -15365,7 +15567,7 @@
       </p:sp>
       <p:pic>
         <p:nvPicPr>
-          <p:cNvPr id="875764510" name=""/>
+          <p:cNvPr id="427868711" name=""/>
           <p:cNvPicPr>
             <a:picLocks noChangeAspect="1"/>
           </p:cNvPicPr>
@@ -15420,7 +15622,7 @@
       </p:grpSpPr>
       <p:sp>
         <p:nvSpPr>
-          <p:cNvPr id="1907380491" name="Titel 3"/>
+          <p:cNvPr id="216130351" name="Titel 3"/>
           <p:cNvSpPr>
             <a:spLocks noGrp="1"/>
           </p:cNvSpPr>
@@ -15486,7 +15688,7 @@
       </p:sp>
       <p:sp>
         <p:nvSpPr>
-          <p:cNvPr id="489193276" name="Textplatzhalter 7"/>
+          <p:cNvPr id="337991440" name="Textplatzhalter 7"/>
           <p:cNvSpPr>
             <a:spLocks noGrp="1"/>
           </p:cNvSpPr>
@@ -15580,7 +15782,7 @@
       </p:sp>
       <p:pic>
         <p:nvPicPr>
-          <p:cNvPr id="531885004" name=""/>
+          <p:cNvPr id="1799514647" name=""/>
           <p:cNvPicPr>
             <a:picLocks noChangeAspect="1"/>
           </p:cNvPicPr>
@@ -15646,7 +15848,7 @@
       </p:grpSpPr>
       <p:sp>
         <p:nvSpPr>
-          <p:cNvPr id="369651496" name="Titel 3"/>
+          <p:cNvPr id="133960426" name="Titel 3"/>
           <p:cNvSpPr>
             <a:spLocks noGrp="1"/>
           </p:cNvSpPr>
@@ -15712,7 +15914,7 @@
       </p:sp>
       <p:sp>
         <p:nvSpPr>
-          <p:cNvPr id="1829170922" name="Textplatzhalter 7"/>
+          <p:cNvPr id="1705709399" name="Textplatzhalter 7"/>
           <p:cNvSpPr>
             <a:spLocks noGrp="1"/>
           </p:cNvSpPr>
@@ -15806,7 +16008,7 @@
       </p:sp>
       <p:pic>
         <p:nvPicPr>
-          <p:cNvPr id="880144532" name=""/>
+          <p:cNvPr id="1393423571" name=""/>
           <p:cNvPicPr>
             <a:picLocks noChangeAspect="1"/>
           </p:cNvPicPr>
@@ -15873,7 +16075,7 @@
       </p:grpSpPr>
       <p:sp>
         <p:nvSpPr>
-          <p:cNvPr id="567250754" name="Titel 3"/>
+          <p:cNvPr id="1418445871" name="Titel 3"/>
           <p:cNvSpPr>
             <a:spLocks noGrp="1"/>
           </p:cNvSpPr>
@@ -15939,7 +16141,7 @@
       </p:sp>
       <p:sp>
         <p:nvSpPr>
-          <p:cNvPr id="1048512062" name="Textplatzhalter 7"/>
+          <p:cNvPr id="523520360" name="Textplatzhalter 7"/>
           <p:cNvSpPr>
             <a:spLocks noGrp="1"/>
           </p:cNvSpPr>
@@ -16033,7 +16235,7 @@
       </p:sp>
       <p:pic>
         <p:nvPicPr>
-          <p:cNvPr id="1655524945" name=""/>
+          <p:cNvPr id="1619872850" name=""/>
           <p:cNvPicPr>
             <a:picLocks noChangeAspect="1"/>
           </p:cNvPicPr>
@@ -16099,7 +16301,7 @@
       </p:grpSpPr>
       <p:sp>
         <p:nvSpPr>
-          <p:cNvPr id="412072782" name="Titel 3"/>
+          <p:cNvPr id="1290797437" name="Titel 3"/>
           <p:cNvSpPr>
             <a:spLocks noGrp="1"/>
           </p:cNvSpPr>
@@ -16165,7 +16367,7 @@
       </p:sp>
       <p:sp>
         <p:nvSpPr>
-          <p:cNvPr id="1694056849" name="Textplatzhalter 7"/>
+          <p:cNvPr id="1473545959" name="Textplatzhalter 7"/>
           <p:cNvSpPr>
             <a:spLocks noGrp="1"/>
           </p:cNvSpPr>
@@ -16259,7 +16461,7 @@
       </p:sp>
       <p:pic>
         <p:nvPicPr>
-          <p:cNvPr id="1903935708" name=""/>
+          <p:cNvPr id="2096154400" name=""/>
           <p:cNvPicPr>
             <a:picLocks noChangeAspect="1"/>
           </p:cNvPicPr>
@@ -16325,7 +16527,7 @@
       </p:grpSpPr>
       <p:sp>
         <p:nvSpPr>
-          <p:cNvPr id="957106548" name="Titel 3"/>
+          <p:cNvPr id="1201424600" name="Titel 3"/>
           <p:cNvSpPr>
             <a:spLocks noGrp="1"/>
           </p:cNvSpPr>
@@ -16391,7 +16593,7 @@
       </p:sp>
       <p:sp>
         <p:nvSpPr>
-          <p:cNvPr id="1198594815" name="Textplatzhalter 7"/>
+          <p:cNvPr id="389364320" name="Textplatzhalter 7"/>
           <p:cNvSpPr>
             <a:spLocks noGrp="1"/>
           </p:cNvSpPr>
@@ -16485,7 +16687,7 @@
       </p:sp>
       <p:pic>
         <p:nvPicPr>
-          <p:cNvPr id="1185888061" name=""/>
+          <p:cNvPr id="60067201" name=""/>
           <p:cNvPicPr>
             <a:picLocks noChangeAspect="1"/>
           </p:cNvPicPr>
@@ -16551,7 +16753,7 @@
       </p:grpSpPr>
       <p:sp>
         <p:nvSpPr>
-          <p:cNvPr id="1489491819" name="Titel 3"/>
+          <p:cNvPr id="129871922" name="Titel 3"/>
           <p:cNvSpPr>
             <a:spLocks noGrp="1"/>
           </p:cNvSpPr>
@@ -16617,7 +16819,7 @@
       </p:sp>
       <p:sp>
         <p:nvSpPr>
-          <p:cNvPr id="1030387372" name="Textplatzhalter 7"/>
+          <p:cNvPr id="964294920" name="Textplatzhalter 7"/>
           <p:cNvSpPr>
             <a:spLocks noGrp="1"/>
           </p:cNvSpPr>
@@ -16711,7 +16913,7 @@
       </p:sp>
       <p:pic>
         <p:nvPicPr>
-          <p:cNvPr id="1568043796" name=""/>
+          <p:cNvPr id="2110843935" name=""/>
           <p:cNvPicPr>
             <a:picLocks noChangeAspect="1"/>
           </p:cNvPicPr>

</xml_diff>